<commit_message>
updating with Service Insertion
</commit_message>
<xml_diff>
--- a/images/cloud_wan_inspection_architectures.pptx
+++ b/images/cloud_wan_inspection_architectures.pptx
@@ -6,16 +6,17 @@
     <p:sldMasterId id="2147483668" r:id="rId2"/>
   </p:sldMasterIdLst>
   <p:notesMasterIdLst>
-    <p:notesMasterId r:id="rId7"/>
+    <p:notesMasterId r:id="rId8"/>
   </p:notesMasterIdLst>
   <p:handoutMasterIdLst>
-    <p:handoutMasterId r:id="rId8"/>
+    <p:handoutMasterId r:id="rId9"/>
   </p:handoutMasterIdLst>
   <p:sldIdLst>
     <p:sldId id="277" r:id="rId3"/>
-    <p:sldId id="278" r:id="rId4"/>
-    <p:sldId id="292" r:id="rId5"/>
-    <p:sldId id="291" r:id="rId6"/>
+    <p:sldId id="293" r:id="rId4"/>
+    <p:sldId id="278" r:id="rId5"/>
+    <p:sldId id="292" r:id="rId6"/>
+    <p:sldId id="291" r:id="rId7"/>
   </p:sldIdLst>
   <p:sldSz cx="12192000" cy="6858000"/>
   <p:notesSz cx="6858000" cy="9144000"/>
@@ -326,7 +327,7 @@
           <a:p>
             <a:fld id="{2B8CE3A8-6540-644E-A52C-9D2F3FC005B2}" type="datetimeFigureOut">
               <a:rPr lang="en-US" smtClean="0"/>
-              <a:t>2/28/23</a:t>
+              <a:t>6/13/24</a:t>
             </a:fld>
             <a:endParaRPr lang="en-US"/>
           </a:p>
@@ -503,7 +504,7 @@
           <a:p>
             <a:fld id="{8963D1AE-04B2-F147-8122-2A32BD7879DD}" type="datetimeFigureOut">
               <a:rPr lang="en-US" smtClean="0"/>
-              <a:t>2/28/23</a:t>
+              <a:t>6/13/24</a:t>
             </a:fld>
             <a:endParaRPr lang="en-US"/>
           </a:p>
@@ -6940,6 +6941,3928 @@
         </p:nvSpPr>
         <p:spPr>
           <a:xfrm>
+            <a:off x="1600200" y="838200"/>
+            <a:ext cx="8688504" cy="5029200"/>
+          </a:xfrm>
+          <a:prstGeom prst="rect">
+            <a:avLst/>
+          </a:prstGeom>
+          <a:noFill/>
+          <a:ln w="12700">
+            <a:solidFill>
+              <a:srgbClr val="141B23"/>
+            </a:solidFill>
+          </a:ln>
+        </p:spPr>
+        <p:style>
+          <a:lnRef idx="2">
+            <a:schemeClr val="accent1">
+              <a:shade val="50000"/>
+            </a:schemeClr>
+          </a:lnRef>
+          <a:fillRef idx="1">
+            <a:schemeClr val="accent1"/>
+          </a:fillRef>
+          <a:effectRef idx="0">
+            <a:schemeClr val="accent1"/>
+          </a:effectRef>
+          <a:fontRef idx="minor">
+            <a:schemeClr val="lt1"/>
+          </a:fontRef>
+        </p:style>
+        <p:txBody>
+          <a:bodyPr rot="0" spcFirstLastPara="0" vertOverflow="overflow" horzOverflow="overflow" vert="horz" wrap="square" lIns="457200" tIns="91440" rIns="91440" bIns="45720" numCol="1" spcCol="0" rtlCol="0" fromWordArt="0" anchor="t" anchorCtr="0" forceAA="0" compatLnSpc="1">
+            <a:prstTxWarp prst="textNoShape">
+              <a:avLst/>
+            </a:prstTxWarp>
+            <a:noAutofit/>
+          </a:bodyPr>
+          <a:lstStyle/>
+          <a:p>
+            <a:pPr algn="l"/>
+            <a:r>
+              <a:rPr lang="en-US" sz="1000" dirty="0">
+                <a:solidFill>
+                  <a:schemeClr val="tx1"/>
+                </a:solidFill>
+                <a:latin typeface="Amazon Ember" panose="020B0603020204020204" pitchFamily="34" charset="0"/>
+                <a:ea typeface="Amazon Ember" panose="020B0603020204020204" pitchFamily="34" charset="0"/>
+                <a:cs typeface="Amazon Ember" panose="020B0603020204020204" pitchFamily="34" charset="0"/>
+              </a:rPr>
+              <a:t>AWS Cloud</a:t>
+            </a:r>
+          </a:p>
+        </p:txBody>
+      </p:sp>
+      <p:pic>
+        <p:nvPicPr>
+          <p:cNvPr id="14" name="Graphic 13">
+            <a:extLst>
+              <a:ext uri="{FF2B5EF4-FFF2-40B4-BE49-F238E27FC236}">
+                <a16:creationId xmlns:a16="http://schemas.microsoft.com/office/drawing/2014/main" id="{3568EC8C-B1AD-4DA7-3D33-1D2674875B48}"/>
+              </a:ext>
+            </a:extLst>
+          </p:cNvPr>
+          <p:cNvPicPr>
+            <a:picLocks noChangeAspect="1"/>
+          </p:cNvPicPr>
+          <p:nvPr/>
+        </p:nvPicPr>
+        <p:blipFill>
+          <a:blip r:embed="rId2">
+            <a:extLst>
+              <a:ext uri="{96DAC541-7B7A-43D3-8B79-37D633B846F1}">
+                <asvg:svgBlip xmlns:asvg="http://schemas.microsoft.com/office/drawing/2016/SVG/main" r:embed="rId3"/>
+              </a:ext>
+            </a:extLst>
+          </a:blip>
+          <a:stretch>
+            <a:fillRect/>
+          </a:stretch>
+        </p:blipFill>
+        <p:spPr>
+          <a:xfrm>
+            <a:off x="1600200" y="841241"/>
+            <a:ext cx="330200" cy="330200"/>
+          </a:xfrm>
+          <a:prstGeom prst="rect">
+            <a:avLst/>
+          </a:prstGeom>
+        </p:spPr>
+      </p:pic>
+      <p:grpSp>
+        <p:nvGrpSpPr>
+          <p:cNvPr id="144" name="Group 143">
+            <a:extLst>
+              <a:ext uri="{FF2B5EF4-FFF2-40B4-BE49-F238E27FC236}">
+                <a16:creationId xmlns:a16="http://schemas.microsoft.com/office/drawing/2014/main" id="{9917C3C0-5E8F-B9D9-CFE6-A1D9DCFC3188}"/>
+              </a:ext>
+            </a:extLst>
+          </p:cNvPr>
+          <p:cNvGrpSpPr/>
+          <p:nvPr/>
+        </p:nvGrpSpPr>
+        <p:grpSpPr>
+          <a:xfrm>
+            <a:off x="2226426" y="1244679"/>
+            <a:ext cx="2590800" cy="4546522"/>
+            <a:chOff x="685800" y="1560634"/>
+            <a:chExt cx="2590800" cy="4382966"/>
+          </a:xfrm>
+        </p:grpSpPr>
+        <p:sp>
+          <p:nvSpPr>
+            <p:cNvPr id="140" name="Rectangle 139">
+              <a:extLst>
+                <a:ext uri="{FF2B5EF4-FFF2-40B4-BE49-F238E27FC236}">
+                  <a16:creationId xmlns:a16="http://schemas.microsoft.com/office/drawing/2014/main" id="{2DAD5860-FE3F-A2D7-AAB9-94A0539AAB43}"/>
+                </a:ext>
+              </a:extLst>
+            </p:cNvPr>
+            <p:cNvSpPr/>
+            <p:nvPr/>
+          </p:nvSpPr>
+          <p:spPr>
+            <a:xfrm>
+              <a:off x="686276" y="1567128"/>
+              <a:ext cx="2590324" cy="4376472"/>
+            </a:xfrm>
+            <a:prstGeom prst="rect">
+              <a:avLst/>
+            </a:prstGeom>
+            <a:noFill/>
+            <a:ln w="12700">
+              <a:solidFill>
+                <a:srgbClr val="5B9CD5"/>
+              </a:solidFill>
+              <a:prstDash val="sysDash"/>
+            </a:ln>
+          </p:spPr>
+          <p:style>
+            <a:lnRef idx="2">
+              <a:schemeClr val="accent1">
+                <a:shade val="50000"/>
+              </a:schemeClr>
+            </a:lnRef>
+            <a:fillRef idx="1">
+              <a:schemeClr val="accent1"/>
+            </a:fillRef>
+            <a:effectRef idx="0">
+              <a:schemeClr val="accent1"/>
+            </a:effectRef>
+            <a:fontRef idx="minor">
+              <a:schemeClr val="lt1"/>
+            </a:fontRef>
+          </p:style>
+          <p:txBody>
+            <a:bodyPr lIns="502920" tIns="91440"/>
+            <a:lstStyle/>
+            <a:p>
+              <a:pPr eaLnBrk="1" fontAlgn="auto" hangingPunct="1">
+                <a:spcBef>
+                  <a:spcPts val="0"/>
+                </a:spcBef>
+                <a:spcAft>
+                  <a:spcPts val="0"/>
+                </a:spcAft>
+                <a:defRPr/>
+              </a:pPr>
+              <a:endParaRPr lang="en-US" sz="1200" dirty="0">
+                <a:solidFill>
+                  <a:srgbClr val="5B9CD5"/>
+                </a:solidFill>
+                <a:latin typeface="Amazon Ember" panose="020B0603020204020204" pitchFamily="34" charset="0"/>
+                <a:ea typeface="Amazon Ember" panose="020B0603020204020204" pitchFamily="34" charset="0"/>
+                <a:cs typeface="Amazon Ember" panose="020B0603020204020204" pitchFamily="34" charset="0"/>
+              </a:endParaRPr>
+            </a:p>
+          </p:txBody>
+        </p:sp>
+        <p:pic>
+          <p:nvPicPr>
+            <p:cNvPr id="141" name="Graphic 140">
+              <a:extLst>
+                <a:ext uri="{FF2B5EF4-FFF2-40B4-BE49-F238E27FC236}">
+                  <a16:creationId xmlns:a16="http://schemas.microsoft.com/office/drawing/2014/main" id="{E950BB5B-1C08-7C1D-3639-808A3E198627}"/>
+                </a:ext>
+              </a:extLst>
+            </p:cNvPr>
+            <p:cNvPicPr>
+              <a:picLocks noChangeAspect="1"/>
+            </p:cNvPicPr>
+            <p:nvPr/>
+          </p:nvPicPr>
+          <p:blipFill>
+            <a:blip r:embed="rId4">
+              <a:extLst>
+                <a:ext uri="{96DAC541-7B7A-43D3-8B79-37D633B846F1}">
+                  <asvg:svgBlip xmlns:asvg="http://schemas.microsoft.com/office/drawing/2016/SVG/main" r:embed="rId5"/>
+                </a:ext>
+              </a:extLst>
+            </a:blip>
+            <a:stretch>
+              <a:fillRect/>
+            </a:stretch>
+          </p:blipFill>
+          <p:spPr>
+            <a:xfrm>
+              <a:off x="685800" y="1560635"/>
+              <a:ext cx="228600" cy="228600"/>
+            </a:xfrm>
+            <a:prstGeom prst="rect">
+              <a:avLst/>
+            </a:prstGeom>
+          </p:spPr>
+        </p:pic>
+        <p:sp>
+          <p:nvSpPr>
+            <p:cNvPr id="143" name="TextBox 142">
+              <a:extLst>
+                <a:ext uri="{FF2B5EF4-FFF2-40B4-BE49-F238E27FC236}">
+                  <a16:creationId xmlns:a16="http://schemas.microsoft.com/office/drawing/2014/main" id="{C16D664F-3659-677C-F42B-308B2110CECD}"/>
+                </a:ext>
+              </a:extLst>
+            </p:cNvPr>
+            <p:cNvSpPr txBox="1"/>
+            <p:nvPr/>
+          </p:nvSpPr>
+          <p:spPr>
+            <a:xfrm>
+              <a:off x="838200" y="1560634"/>
+              <a:ext cx="665215" cy="215444"/>
+            </a:xfrm>
+            <a:prstGeom prst="rect">
+              <a:avLst/>
+            </a:prstGeom>
+            <a:noFill/>
+          </p:spPr>
+          <p:txBody>
+            <a:bodyPr wrap="square">
+              <a:spAutoFit/>
+            </a:bodyPr>
+            <a:lstStyle/>
+            <a:p>
+              <a:pPr eaLnBrk="1" fontAlgn="auto" hangingPunct="1">
+                <a:spcBef>
+                  <a:spcPts val="0"/>
+                </a:spcBef>
+                <a:spcAft>
+                  <a:spcPts val="0"/>
+                </a:spcAft>
+                <a:defRPr/>
+              </a:pPr>
+              <a:r>
+                <a:rPr lang="en-US" sz="800" dirty="0">
+                  <a:solidFill>
+                    <a:srgbClr val="5B9CD5"/>
+                  </a:solidFill>
+                  <a:latin typeface="Amazon Ember" panose="020B0603020204020204" pitchFamily="34" charset="0"/>
+                  <a:ea typeface="Amazon Ember" panose="020B0603020204020204" pitchFamily="34" charset="0"/>
+                  <a:cs typeface="Amazon Ember" panose="020B0603020204020204" pitchFamily="34" charset="0"/>
+                </a:rPr>
+                <a:t>us-east-1</a:t>
+              </a:r>
+              <a:endParaRPr lang="en-US" sz="1050" dirty="0">
+                <a:solidFill>
+                  <a:srgbClr val="5B9CD5"/>
+                </a:solidFill>
+                <a:latin typeface="Amazon Ember" panose="020B0603020204020204" pitchFamily="34" charset="0"/>
+                <a:ea typeface="Amazon Ember" panose="020B0603020204020204" pitchFamily="34" charset="0"/>
+                <a:cs typeface="Amazon Ember" panose="020B0603020204020204" pitchFamily="34" charset="0"/>
+              </a:endParaRPr>
+            </a:p>
+          </p:txBody>
+        </p:sp>
+      </p:grpSp>
+      <p:grpSp>
+        <p:nvGrpSpPr>
+          <p:cNvPr id="145" name="Group 144">
+            <a:extLst>
+              <a:ext uri="{FF2B5EF4-FFF2-40B4-BE49-F238E27FC236}">
+                <a16:creationId xmlns:a16="http://schemas.microsoft.com/office/drawing/2014/main" id="{20D00342-1563-2EB7-9000-96A3E8B6F52F}"/>
+              </a:ext>
+            </a:extLst>
+          </p:cNvPr>
+          <p:cNvGrpSpPr/>
+          <p:nvPr/>
+        </p:nvGrpSpPr>
+        <p:grpSpPr>
+          <a:xfrm>
+            <a:off x="4892858" y="1244678"/>
+            <a:ext cx="2590800" cy="4546523"/>
+            <a:chOff x="685800" y="1560634"/>
+            <a:chExt cx="2590800" cy="4382966"/>
+          </a:xfrm>
+        </p:grpSpPr>
+        <p:sp>
+          <p:nvSpPr>
+            <p:cNvPr id="146" name="Rectangle 145">
+              <a:extLst>
+                <a:ext uri="{FF2B5EF4-FFF2-40B4-BE49-F238E27FC236}">
+                  <a16:creationId xmlns:a16="http://schemas.microsoft.com/office/drawing/2014/main" id="{4FC4AF52-AFF3-4E5F-DB50-16CB6EA0030A}"/>
+                </a:ext>
+              </a:extLst>
+            </p:cNvPr>
+            <p:cNvSpPr/>
+            <p:nvPr/>
+          </p:nvSpPr>
+          <p:spPr>
+            <a:xfrm>
+              <a:off x="686276" y="1567128"/>
+              <a:ext cx="2590324" cy="4376472"/>
+            </a:xfrm>
+            <a:prstGeom prst="rect">
+              <a:avLst/>
+            </a:prstGeom>
+            <a:noFill/>
+            <a:ln w="12700">
+              <a:solidFill>
+                <a:srgbClr val="5B9CD5"/>
+              </a:solidFill>
+              <a:prstDash val="sysDash"/>
+            </a:ln>
+          </p:spPr>
+          <p:style>
+            <a:lnRef idx="2">
+              <a:schemeClr val="accent1">
+                <a:shade val="50000"/>
+              </a:schemeClr>
+            </a:lnRef>
+            <a:fillRef idx="1">
+              <a:schemeClr val="accent1"/>
+            </a:fillRef>
+            <a:effectRef idx="0">
+              <a:schemeClr val="accent1"/>
+            </a:effectRef>
+            <a:fontRef idx="minor">
+              <a:schemeClr val="lt1"/>
+            </a:fontRef>
+          </p:style>
+          <p:txBody>
+            <a:bodyPr lIns="502920" tIns="91440"/>
+            <a:lstStyle/>
+            <a:p>
+              <a:pPr eaLnBrk="1" fontAlgn="auto" hangingPunct="1">
+                <a:spcBef>
+                  <a:spcPts val="0"/>
+                </a:spcBef>
+                <a:spcAft>
+                  <a:spcPts val="0"/>
+                </a:spcAft>
+                <a:defRPr/>
+              </a:pPr>
+              <a:endParaRPr lang="en-US" sz="1200" dirty="0">
+                <a:solidFill>
+                  <a:srgbClr val="5B9CD5"/>
+                </a:solidFill>
+                <a:latin typeface="Amazon Ember" panose="020B0603020204020204" pitchFamily="34" charset="0"/>
+                <a:ea typeface="Amazon Ember" panose="020B0603020204020204" pitchFamily="34" charset="0"/>
+                <a:cs typeface="Amazon Ember" panose="020B0603020204020204" pitchFamily="34" charset="0"/>
+              </a:endParaRPr>
+            </a:p>
+          </p:txBody>
+        </p:sp>
+        <p:pic>
+          <p:nvPicPr>
+            <p:cNvPr id="147" name="Graphic 146">
+              <a:extLst>
+                <a:ext uri="{FF2B5EF4-FFF2-40B4-BE49-F238E27FC236}">
+                  <a16:creationId xmlns:a16="http://schemas.microsoft.com/office/drawing/2014/main" id="{EF3EC300-936E-CC35-F4B2-19E091457DA0}"/>
+                </a:ext>
+              </a:extLst>
+            </p:cNvPr>
+            <p:cNvPicPr>
+              <a:picLocks noChangeAspect="1"/>
+            </p:cNvPicPr>
+            <p:nvPr/>
+          </p:nvPicPr>
+          <p:blipFill>
+            <a:blip r:embed="rId4">
+              <a:extLst>
+                <a:ext uri="{96DAC541-7B7A-43D3-8B79-37D633B846F1}">
+                  <asvg:svgBlip xmlns:asvg="http://schemas.microsoft.com/office/drawing/2016/SVG/main" r:embed="rId5"/>
+                </a:ext>
+              </a:extLst>
+            </a:blip>
+            <a:stretch>
+              <a:fillRect/>
+            </a:stretch>
+          </p:blipFill>
+          <p:spPr>
+            <a:xfrm>
+              <a:off x="685800" y="1560635"/>
+              <a:ext cx="228600" cy="228600"/>
+            </a:xfrm>
+            <a:prstGeom prst="rect">
+              <a:avLst/>
+            </a:prstGeom>
+          </p:spPr>
+        </p:pic>
+        <p:sp>
+          <p:nvSpPr>
+            <p:cNvPr id="148" name="TextBox 147">
+              <a:extLst>
+                <a:ext uri="{FF2B5EF4-FFF2-40B4-BE49-F238E27FC236}">
+                  <a16:creationId xmlns:a16="http://schemas.microsoft.com/office/drawing/2014/main" id="{5189E4BC-DE6D-C4A7-F474-A5792E542B75}"/>
+                </a:ext>
+              </a:extLst>
+            </p:cNvPr>
+            <p:cNvSpPr txBox="1"/>
+            <p:nvPr/>
+          </p:nvSpPr>
+          <p:spPr>
+            <a:xfrm>
+              <a:off x="838200" y="1560634"/>
+              <a:ext cx="665215" cy="215444"/>
+            </a:xfrm>
+            <a:prstGeom prst="rect">
+              <a:avLst/>
+            </a:prstGeom>
+            <a:noFill/>
+          </p:spPr>
+          <p:txBody>
+            <a:bodyPr wrap="square">
+              <a:spAutoFit/>
+            </a:bodyPr>
+            <a:lstStyle/>
+            <a:p>
+              <a:pPr eaLnBrk="1" fontAlgn="auto" hangingPunct="1">
+                <a:spcBef>
+                  <a:spcPts val="0"/>
+                </a:spcBef>
+                <a:spcAft>
+                  <a:spcPts val="0"/>
+                </a:spcAft>
+                <a:defRPr/>
+              </a:pPr>
+              <a:r>
+                <a:rPr lang="en-US" sz="800" dirty="0">
+                  <a:solidFill>
+                    <a:srgbClr val="5B9CD5"/>
+                  </a:solidFill>
+                  <a:latin typeface="Amazon Ember" panose="020B0603020204020204" pitchFamily="34" charset="0"/>
+                  <a:ea typeface="Amazon Ember" panose="020B0603020204020204" pitchFamily="34" charset="0"/>
+                  <a:cs typeface="Amazon Ember" panose="020B0603020204020204" pitchFamily="34" charset="0"/>
+                </a:rPr>
+                <a:t>eu-west-1</a:t>
+              </a:r>
+              <a:endParaRPr lang="en-US" sz="1050" dirty="0">
+                <a:solidFill>
+                  <a:srgbClr val="5B9CD5"/>
+                </a:solidFill>
+                <a:latin typeface="Amazon Ember" panose="020B0603020204020204" pitchFamily="34" charset="0"/>
+                <a:ea typeface="Amazon Ember" panose="020B0603020204020204" pitchFamily="34" charset="0"/>
+                <a:cs typeface="Amazon Ember" panose="020B0603020204020204" pitchFamily="34" charset="0"/>
+              </a:endParaRPr>
+            </a:p>
+          </p:txBody>
+        </p:sp>
+      </p:grpSp>
+      <p:grpSp>
+        <p:nvGrpSpPr>
+          <p:cNvPr id="149" name="Group 148">
+            <a:extLst>
+              <a:ext uri="{FF2B5EF4-FFF2-40B4-BE49-F238E27FC236}">
+                <a16:creationId xmlns:a16="http://schemas.microsoft.com/office/drawing/2014/main" id="{855A858E-D8B1-EC62-3EEC-22CC89D470C9}"/>
+              </a:ext>
+            </a:extLst>
+          </p:cNvPr>
+          <p:cNvGrpSpPr/>
+          <p:nvPr/>
+        </p:nvGrpSpPr>
+        <p:grpSpPr>
+          <a:xfrm>
+            <a:off x="7559858" y="1251173"/>
+            <a:ext cx="2590800" cy="4539787"/>
+            <a:chOff x="685800" y="1560634"/>
+            <a:chExt cx="2590800" cy="4382966"/>
+          </a:xfrm>
+        </p:grpSpPr>
+        <p:sp>
+          <p:nvSpPr>
+            <p:cNvPr id="150" name="Rectangle 149">
+              <a:extLst>
+                <a:ext uri="{FF2B5EF4-FFF2-40B4-BE49-F238E27FC236}">
+                  <a16:creationId xmlns:a16="http://schemas.microsoft.com/office/drawing/2014/main" id="{163BD686-1776-6E07-BE09-F16A561931F3}"/>
+                </a:ext>
+              </a:extLst>
+            </p:cNvPr>
+            <p:cNvSpPr/>
+            <p:nvPr/>
+          </p:nvSpPr>
+          <p:spPr>
+            <a:xfrm>
+              <a:off x="686276" y="1567128"/>
+              <a:ext cx="2590324" cy="4376472"/>
+            </a:xfrm>
+            <a:prstGeom prst="rect">
+              <a:avLst/>
+            </a:prstGeom>
+            <a:noFill/>
+            <a:ln w="12700">
+              <a:solidFill>
+                <a:srgbClr val="5B9CD5"/>
+              </a:solidFill>
+              <a:prstDash val="sysDash"/>
+            </a:ln>
+          </p:spPr>
+          <p:style>
+            <a:lnRef idx="2">
+              <a:schemeClr val="accent1">
+                <a:shade val="50000"/>
+              </a:schemeClr>
+            </a:lnRef>
+            <a:fillRef idx="1">
+              <a:schemeClr val="accent1"/>
+            </a:fillRef>
+            <a:effectRef idx="0">
+              <a:schemeClr val="accent1"/>
+            </a:effectRef>
+            <a:fontRef idx="minor">
+              <a:schemeClr val="lt1"/>
+            </a:fontRef>
+          </p:style>
+          <p:txBody>
+            <a:bodyPr lIns="502920" tIns="91440"/>
+            <a:lstStyle/>
+            <a:p>
+              <a:pPr eaLnBrk="1" fontAlgn="auto" hangingPunct="1">
+                <a:spcBef>
+                  <a:spcPts val="0"/>
+                </a:spcBef>
+                <a:spcAft>
+                  <a:spcPts val="0"/>
+                </a:spcAft>
+                <a:defRPr/>
+              </a:pPr>
+              <a:endParaRPr lang="en-US" sz="1200" dirty="0">
+                <a:solidFill>
+                  <a:srgbClr val="5B9CD5"/>
+                </a:solidFill>
+                <a:latin typeface="Amazon Ember" panose="020B0603020204020204" pitchFamily="34" charset="0"/>
+                <a:ea typeface="Amazon Ember" panose="020B0603020204020204" pitchFamily="34" charset="0"/>
+                <a:cs typeface="Amazon Ember" panose="020B0603020204020204" pitchFamily="34" charset="0"/>
+              </a:endParaRPr>
+            </a:p>
+          </p:txBody>
+        </p:sp>
+        <p:pic>
+          <p:nvPicPr>
+            <p:cNvPr id="151" name="Graphic 150">
+              <a:extLst>
+                <a:ext uri="{FF2B5EF4-FFF2-40B4-BE49-F238E27FC236}">
+                  <a16:creationId xmlns:a16="http://schemas.microsoft.com/office/drawing/2014/main" id="{1565DC1B-6FC5-99FE-E5F3-18E92CC931DA}"/>
+                </a:ext>
+              </a:extLst>
+            </p:cNvPr>
+            <p:cNvPicPr>
+              <a:picLocks noChangeAspect="1"/>
+            </p:cNvPicPr>
+            <p:nvPr/>
+          </p:nvPicPr>
+          <p:blipFill>
+            <a:blip r:embed="rId4">
+              <a:extLst>
+                <a:ext uri="{96DAC541-7B7A-43D3-8B79-37D633B846F1}">
+                  <asvg:svgBlip xmlns:asvg="http://schemas.microsoft.com/office/drawing/2016/SVG/main" r:embed="rId5"/>
+                </a:ext>
+              </a:extLst>
+            </a:blip>
+            <a:stretch>
+              <a:fillRect/>
+            </a:stretch>
+          </p:blipFill>
+          <p:spPr>
+            <a:xfrm>
+              <a:off x="685800" y="1560635"/>
+              <a:ext cx="228600" cy="228600"/>
+            </a:xfrm>
+            <a:prstGeom prst="rect">
+              <a:avLst/>
+            </a:prstGeom>
+          </p:spPr>
+        </p:pic>
+        <p:sp>
+          <p:nvSpPr>
+            <p:cNvPr id="152" name="TextBox 151">
+              <a:extLst>
+                <a:ext uri="{FF2B5EF4-FFF2-40B4-BE49-F238E27FC236}">
+                  <a16:creationId xmlns:a16="http://schemas.microsoft.com/office/drawing/2014/main" id="{BE2AB30C-398E-86A1-0859-8D634E874556}"/>
+                </a:ext>
+              </a:extLst>
+            </p:cNvPr>
+            <p:cNvSpPr txBox="1"/>
+            <p:nvPr/>
+          </p:nvSpPr>
+          <p:spPr>
+            <a:xfrm>
+              <a:off x="838200" y="1560634"/>
+              <a:ext cx="907949" cy="215444"/>
+            </a:xfrm>
+            <a:prstGeom prst="rect">
+              <a:avLst/>
+            </a:prstGeom>
+            <a:noFill/>
+          </p:spPr>
+          <p:txBody>
+            <a:bodyPr wrap="square">
+              <a:spAutoFit/>
+            </a:bodyPr>
+            <a:lstStyle/>
+            <a:p>
+              <a:pPr eaLnBrk="1" fontAlgn="auto" hangingPunct="1">
+                <a:spcBef>
+                  <a:spcPts val="0"/>
+                </a:spcBef>
+                <a:spcAft>
+                  <a:spcPts val="0"/>
+                </a:spcAft>
+                <a:defRPr/>
+              </a:pPr>
+              <a:r>
+                <a:rPr lang="en-US" sz="800" dirty="0">
+                  <a:solidFill>
+                    <a:srgbClr val="5B9CD5"/>
+                  </a:solidFill>
+                  <a:latin typeface="Amazon Ember" panose="020B0603020204020204" pitchFamily="34" charset="0"/>
+                  <a:ea typeface="Amazon Ember" panose="020B0603020204020204" pitchFamily="34" charset="0"/>
+                  <a:cs typeface="Amazon Ember" panose="020B0603020204020204" pitchFamily="34" charset="0"/>
+                </a:rPr>
+                <a:t>ap-southeast-2</a:t>
+              </a:r>
+              <a:endParaRPr lang="en-US" sz="1050" dirty="0">
+                <a:solidFill>
+                  <a:srgbClr val="5B9CD5"/>
+                </a:solidFill>
+                <a:latin typeface="Amazon Ember" panose="020B0603020204020204" pitchFamily="34" charset="0"/>
+                <a:ea typeface="Amazon Ember" panose="020B0603020204020204" pitchFamily="34" charset="0"/>
+                <a:cs typeface="Amazon Ember" panose="020B0603020204020204" pitchFamily="34" charset="0"/>
+              </a:endParaRPr>
+            </a:p>
+          </p:txBody>
+        </p:sp>
+      </p:grpSp>
+      <p:sp>
+        <p:nvSpPr>
+          <p:cNvPr id="156" name="Rounded Rectangle 155">
+            <a:extLst>
+              <a:ext uri="{FF2B5EF4-FFF2-40B4-BE49-F238E27FC236}">
+                <a16:creationId xmlns:a16="http://schemas.microsoft.com/office/drawing/2014/main" id="{0D7976F9-074F-B820-E582-AB08A342203F}"/>
+              </a:ext>
+            </a:extLst>
+          </p:cNvPr>
+          <p:cNvSpPr/>
+          <p:nvPr/>
+        </p:nvSpPr>
+        <p:spPr>
+          <a:xfrm>
+            <a:off x="1646772" y="2173755"/>
+            <a:ext cx="8595360" cy="3541245"/>
+          </a:xfrm>
+          <a:prstGeom prst="roundRect">
+            <a:avLst/>
+          </a:prstGeom>
+          <a:solidFill>
+            <a:srgbClr val="F3E4FF"/>
+          </a:solidFill>
+          <a:ln>
+            <a:solidFill>
+              <a:srgbClr val="7030A0"/>
+            </a:solidFill>
+          </a:ln>
+        </p:spPr>
+        <p:style>
+          <a:lnRef idx="2">
+            <a:schemeClr val="accent1">
+              <a:shade val="50000"/>
+            </a:schemeClr>
+          </a:lnRef>
+          <a:fillRef idx="1">
+            <a:schemeClr val="accent1"/>
+          </a:fillRef>
+          <a:effectRef idx="0">
+            <a:schemeClr val="accent1"/>
+          </a:effectRef>
+          <a:fontRef idx="minor">
+            <a:schemeClr val="lt1"/>
+          </a:fontRef>
+        </p:style>
+        <p:txBody>
+          <a:bodyPr rtlCol="0" anchor="ctr"/>
+          <a:lstStyle/>
+          <a:p>
+            <a:pPr algn="ctr"/>
+            <a:endParaRPr lang="en-US">
+              <a:latin typeface="Amazon Ember" panose="020B0603020204020204" pitchFamily="34" charset="0"/>
+              <a:ea typeface="Amazon Ember" panose="020B0603020204020204" pitchFamily="34" charset="0"/>
+              <a:cs typeface="Amazon Ember" panose="020B0603020204020204" pitchFamily="34" charset="0"/>
+            </a:endParaRPr>
+          </a:p>
+        </p:txBody>
+      </p:sp>
+      <p:grpSp>
+        <p:nvGrpSpPr>
+          <p:cNvPr id="155" name="Group 154">
+            <a:extLst>
+              <a:ext uri="{FF2B5EF4-FFF2-40B4-BE49-F238E27FC236}">
+                <a16:creationId xmlns:a16="http://schemas.microsoft.com/office/drawing/2014/main" id="{33B3F45B-B1B5-7633-B865-CD56BD50BB33}"/>
+              </a:ext>
+            </a:extLst>
+          </p:cNvPr>
+          <p:cNvGrpSpPr/>
+          <p:nvPr/>
+        </p:nvGrpSpPr>
+        <p:grpSpPr>
+          <a:xfrm>
+            <a:off x="1459402" y="3328711"/>
+            <a:ext cx="1065549" cy="852073"/>
+            <a:chOff x="64139" y="3704415"/>
+            <a:chExt cx="1065549" cy="852073"/>
+          </a:xfrm>
+        </p:grpSpPr>
+        <p:sp>
+          <p:nvSpPr>
+            <p:cNvPr id="154" name="TextBox 9">
+              <a:extLst>
+                <a:ext uri="{FF2B5EF4-FFF2-40B4-BE49-F238E27FC236}">
+                  <a16:creationId xmlns:a16="http://schemas.microsoft.com/office/drawing/2014/main" id="{C6B57A44-8F9B-100D-86DD-FAE7951468BD}"/>
+                </a:ext>
+              </a:extLst>
+            </p:cNvPr>
+            <p:cNvSpPr txBox="1">
+              <a:spLocks noChangeArrowheads="1"/>
+            </p:cNvSpPr>
+            <p:nvPr/>
+          </p:nvSpPr>
+          <p:spPr bwMode="auto">
+            <a:xfrm>
+              <a:off x="64139" y="4187156"/>
+              <a:ext cx="1065549" cy="369332"/>
+            </a:xfrm>
+            <a:prstGeom prst="rect">
+              <a:avLst/>
+            </a:prstGeom>
+            <a:noFill/>
+            <a:ln>
+              <a:noFill/>
+            </a:ln>
+            <a:extLst>
+              <a:ext uri="{909E8E84-426E-40DD-AFC4-6F175D3DCCD1}">
+                <a14:hiddenFill xmlns:a14="http://schemas.microsoft.com/office/drawing/2010/main">
+                  <a:solidFill>
+                    <a:srgbClr val="FFFFFF"/>
+                  </a:solidFill>
+                </a14:hiddenFill>
+              </a:ext>
+              <a:ext uri="{91240B29-F687-4F45-9708-019B960494DF}">
+                <a14:hiddenLine xmlns:a14="http://schemas.microsoft.com/office/drawing/2010/main" w="9525">
+                  <a:solidFill>
+                    <a:srgbClr val="000000"/>
+                  </a:solidFill>
+                  <a:miter lim="800000"/>
+                  <a:headEnd/>
+                  <a:tailEnd/>
+                </a14:hiddenLine>
+              </a:ext>
+            </a:extLst>
+          </p:spPr>
+          <p:txBody>
+            <a:bodyPr wrap="square">
+              <a:spAutoFit/>
+            </a:bodyPr>
+            <a:lstStyle>
+              <a:lvl1pPr>
+                <a:defRPr>
+                  <a:solidFill>
+                    <a:schemeClr val="tx1"/>
+                  </a:solidFill>
+                  <a:latin typeface="Calibri" panose="020F0502020204030204" pitchFamily="34" charset="0"/>
+                </a:defRPr>
+              </a:lvl1pPr>
+              <a:lvl2pPr marL="742950" indent="-285750">
+                <a:defRPr>
+                  <a:solidFill>
+                    <a:schemeClr val="tx1"/>
+                  </a:solidFill>
+                  <a:latin typeface="Calibri" panose="020F0502020204030204" pitchFamily="34" charset="0"/>
+                </a:defRPr>
+              </a:lvl2pPr>
+              <a:lvl3pPr marL="1143000" indent="-228600">
+                <a:defRPr>
+                  <a:solidFill>
+                    <a:schemeClr val="tx1"/>
+                  </a:solidFill>
+                  <a:latin typeface="Calibri" panose="020F0502020204030204" pitchFamily="34" charset="0"/>
+                </a:defRPr>
+              </a:lvl3pPr>
+              <a:lvl4pPr marL="1600200" indent="-228600">
+                <a:defRPr>
+                  <a:solidFill>
+                    <a:schemeClr val="tx1"/>
+                  </a:solidFill>
+                  <a:latin typeface="Calibri" panose="020F0502020204030204" pitchFamily="34" charset="0"/>
+                </a:defRPr>
+              </a:lvl4pPr>
+              <a:lvl5pPr marL="2057400" indent="-228600">
+                <a:defRPr>
+                  <a:solidFill>
+                    <a:schemeClr val="tx1"/>
+                  </a:solidFill>
+                  <a:latin typeface="Calibri" panose="020F0502020204030204" pitchFamily="34" charset="0"/>
+                </a:defRPr>
+              </a:lvl5pPr>
+              <a:lvl6pPr marL="2514600" indent="-228600" eaLnBrk="0" fontAlgn="base" hangingPunct="0">
+                <a:spcBef>
+                  <a:spcPct val="0"/>
+                </a:spcBef>
+                <a:spcAft>
+                  <a:spcPct val="0"/>
+                </a:spcAft>
+                <a:defRPr>
+                  <a:solidFill>
+                    <a:schemeClr val="tx1"/>
+                  </a:solidFill>
+                  <a:latin typeface="Calibri" panose="020F0502020204030204" pitchFamily="34" charset="0"/>
+                </a:defRPr>
+              </a:lvl6pPr>
+              <a:lvl7pPr marL="2971800" indent="-228600" eaLnBrk="0" fontAlgn="base" hangingPunct="0">
+                <a:spcBef>
+                  <a:spcPct val="0"/>
+                </a:spcBef>
+                <a:spcAft>
+                  <a:spcPct val="0"/>
+                </a:spcAft>
+                <a:defRPr>
+                  <a:solidFill>
+                    <a:schemeClr val="tx1"/>
+                  </a:solidFill>
+                  <a:latin typeface="Calibri" panose="020F0502020204030204" pitchFamily="34" charset="0"/>
+                </a:defRPr>
+              </a:lvl7pPr>
+              <a:lvl8pPr marL="3429000" indent="-228600" eaLnBrk="0" fontAlgn="base" hangingPunct="0">
+                <a:spcBef>
+                  <a:spcPct val="0"/>
+                </a:spcBef>
+                <a:spcAft>
+                  <a:spcPct val="0"/>
+                </a:spcAft>
+                <a:defRPr>
+                  <a:solidFill>
+                    <a:schemeClr val="tx1"/>
+                  </a:solidFill>
+                  <a:latin typeface="Calibri" panose="020F0502020204030204" pitchFamily="34" charset="0"/>
+                </a:defRPr>
+              </a:lvl8pPr>
+              <a:lvl9pPr marL="3886200" indent="-228600" eaLnBrk="0" fontAlgn="base" hangingPunct="0">
+                <a:spcBef>
+                  <a:spcPct val="0"/>
+                </a:spcBef>
+                <a:spcAft>
+                  <a:spcPct val="0"/>
+                </a:spcAft>
+                <a:defRPr>
+                  <a:solidFill>
+                    <a:schemeClr val="tx1"/>
+                  </a:solidFill>
+                  <a:latin typeface="Calibri" panose="020F0502020204030204" pitchFamily="34" charset="0"/>
+                </a:defRPr>
+              </a:lvl9pPr>
+            </a:lstStyle>
+            <a:p>
+              <a:pPr algn="ctr" eaLnBrk="1" hangingPunct="1"/>
+              <a:r>
+                <a:rPr lang="en-US" altLang="en-US" sz="900" dirty="0">
+                  <a:latin typeface="Amazon Ember" panose="020B0603020204020204" pitchFamily="34" charset="0"/>
+                  <a:ea typeface="Amazon Ember" panose="020B0603020204020204" pitchFamily="34" charset="0"/>
+                  <a:cs typeface="Amazon Ember" panose="020B0603020204020204" pitchFamily="34" charset="0"/>
+                </a:rPr>
+                <a:t>AWS Cloud </a:t>
+              </a:r>
+            </a:p>
+            <a:p>
+              <a:pPr algn="ctr" eaLnBrk="1" hangingPunct="1"/>
+              <a:r>
+                <a:rPr lang="en-US" altLang="en-US" sz="900" dirty="0">
+                  <a:latin typeface="Amazon Ember" panose="020B0603020204020204" pitchFamily="34" charset="0"/>
+                  <a:ea typeface="Amazon Ember" panose="020B0603020204020204" pitchFamily="34" charset="0"/>
+                  <a:cs typeface="Amazon Ember" panose="020B0603020204020204" pitchFamily="34" charset="0"/>
+                </a:rPr>
+                <a:t>WAN</a:t>
+              </a:r>
+            </a:p>
+          </p:txBody>
+        </p:sp>
+        <p:pic>
+          <p:nvPicPr>
+            <p:cNvPr id="153" name="Graphic 7">
+              <a:extLst>
+                <a:ext uri="{FF2B5EF4-FFF2-40B4-BE49-F238E27FC236}">
+                  <a16:creationId xmlns:a16="http://schemas.microsoft.com/office/drawing/2014/main" id="{ACCE1811-B80D-5A93-529A-2F4B0349023C}"/>
+                </a:ext>
+              </a:extLst>
+            </p:cNvPr>
+            <p:cNvPicPr>
+              <a:picLocks noChangeAspect="1" noChangeArrowheads="1"/>
+            </p:cNvPicPr>
+            <p:nvPr/>
+          </p:nvPicPr>
+          <p:blipFill>
+            <a:blip r:embed="rId6">
+              <a:extLst>
+                <a:ext uri="{96DAC541-7B7A-43D3-8B79-37D633B846F1}">
+                  <asvg:svgBlip xmlns:asvg="http://schemas.microsoft.com/office/drawing/2016/SVG/main" r:embed="rId7"/>
+                </a:ext>
+              </a:extLst>
+            </a:blip>
+            <a:srcRect/>
+            <a:stretch/>
+          </p:blipFill>
+          <p:spPr bwMode="auto">
+            <a:xfrm>
+              <a:off x="340303" y="3704415"/>
+              <a:ext cx="513220" cy="513220"/>
+            </a:xfrm>
+            <a:prstGeom prst="rect">
+              <a:avLst/>
+            </a:prstGeom>
+            <a:noFill/>
+            <a:ln>
+              <a:noFill/>
+            </a:ln>
+            <a:extLst>
+              <a:ext uri="{909E8E84-426E-40DD-AFC4-6F175D3DCCD1}">
+                <a14:hiddenFill xmlns:a14="http://schemas.microsoft.com/office/drawing/2010/main">
+                  <a:solidFill>
+                    <a:srgbClr val="FFFFFF"/>
+                  </a:solidFill>
+                </a14:hiddenFill>
+              </a:ext>
+              <a:ext uri="{91240B29-F687-4F45-9708-019B960494DF}">
+                <a14:hiddenLine xmlns:a14="http://schemas.microsoft.com/office/drawing/2010/main" w="9525">
+                  <a:solidFill>
+                    <a:srgbClr val="000000"/>
+                  </a:solidFill>
+                  <a:miter lim="800000"/>
+                  <a:headEnd/>
+                  <a:tailEnd/>
+                </a14:hiddenLine>
+              </a:ext>
+            </a:extLst>
+          </p:spPr>
+        </p:pic>
+      </p:grpSp>
+      <p:sp>
+        <p:nvSpPr>
+          <p:cNvPr id="157" name="Rounded Rectangle 156">
+            <a:extLst>
+              <a:ext uri="{FF2B5EF4-FFF2-40B4-BE49-F238E27FC236}">
+                <a16:creationId xmlns:a16="http://schemas.microsoft.com/office/drawing/2014/main" id="{A1A19510-688B-C1CB-7B42-AFA4AF99ADF7}"/>
+              </a:ext>
+            </a:extLst>
+          </p:cNvPr>
+          <p:cNvSpPr/>
+          <p:nvPr/>
+        </p:nvSpPr>
+        <p:spPr>
+          <a:xfrm>
+            <a:off x="2349508" y="2254056"/>
+            <a:ext cx="7644397" cy="1028968"/>
+          </a:xfrm>
+          <a:prstGeom prst="roundRect">
+            <a:avLst/>
+          </a:prstGeom>
+          <a:solidFill>
+            <a:schemeClr val="accent6">
+              <a:lumMod val="20000"/>
+              <a:lumOff val="80000"/>
+            </a:schemeClr>
+          </a:solidFill>
+          <a:ln>
+            <a:solidFill>
+              <a:srgbClr val="7030A0"/>
+            </a:solidFill>
+          </a:ln>
+        </p:spPr>
+        <p:style>
+          <a:lnRef idx="2">
+            <a:schemeClr val="accent1">
+              <a:shade val="50000"/>
+            </a:schemeClr>
+          </a:lnRef>
+          <a:fillRef idx="1">
+            <a:schemeClr val="accent1"/>
+          </a:fillRef>
+          <a:effectRef idx="0">
+            <a:schemeClr val="accent1"/>
+          </a:effectRef>
+          <a:fontRef idx="minor">
+            <a:schemeClr val="lt1"/>
+          </a:fontRef>
+        </p:style>
+        <p:txBody>
+          <a:bodyPr vert="vert270" rtlCol="0" anchor="t"/>
+          <a:lstStyle/>
+          <a:p>
+            <a:pPr algn="ctr"/>
+            <a:r>
+              <a:rPr lang="en-US" sz="600" dirty="0">
+                <a:solidFill>
+                  <a:schemeClr val="tx1"/>
+                </a:solidFill>
+                <a:latin typeface="Amazon Ember" panose="020B0603020204020204" pitchFamily="34" charset="0"/>
+                <a:ea typeface="Amazon Ember" panose="020B0603020204020204" pitchFamily="34" charset="0"/>
+                <a:cs typeface="Amazon Ember" panose="020B0603020204020204" pitchFamily="34" charset="0"/>
+              </a:rPr>
+              <a:t>Production Segment</a:t>
+            </a:r>
+          </a:p>
+        </p:txBody>
+      </p:sp>
+      <p:grpSp>
+        <p:nvGrpSpPr>
+          <p:cNvPr id="163" name="Group 162">
+            <a:extLst>
+              <a:ext uri="{FF2B5EF4-FFF2-40B4-BE49-F238E27FC236}">
+                <a16:creationId xmlns:a16="http://schemas.microsoft.com/office/drawing/2014/main" id="{7D42ABE7-6671-1D87-5DAC-D675074A8D00}"/>
+              </a:ext>
+            </a:extLst>
+          </p:cNvPr>
+          <p:cNvGrpSpPr/>
+          <p:nvPr/>
+        </p:nvGrpSpPr>
+        <p:grpSpPr>
+          <a:xfrm>
+            <a:off x="2305160" y="1648204"/>
+            <a:ext cx="521396" cy="337354"/>
+            <a:chOff x="1754915" y="2275224"/>
+            <a:chExt cx="521396" cy="337354"/>
+          </a:xfrm>
+        </p:grpSpPr>
+        <p:sp>
+          <p:nvSpPr>
+            <p:cNvPr id="159" name="Rectangle 158">
+              <a:extLst>
+                <a:ext uri="{FF2B5EF4-FFF2-40B4-BE49-F238E27FC236}">
+                  <a16:creationId xmlns:a16="http://schemas.microsoft.com/office/drawing/2014/main" id="{516DA366-5BAB-EA5F-BF35-D7E600AC64F5}"/>
+                </a:ext>
+              </a:extLst>
+            </p:cNvPr>
+            <p:cNvSpPr/>
+            <p:nvPr/>
+          </p:nvSpPr>
+          <p:spPr>
+            <a:xfrm>
+              <a:off x="1754915" y="2280184"/>
+              <a:ext cx="521396" cy="332394"/>
+            </a:xfrm>
+            <a:prstGeom prst="rect">
+              <a:avLst/>
+            </a:prstGeom>
+            <a:noFill/>
+            <a:ln w="12700">
+              <a:solidFill>
+                <a:schemeClr val="accent5"/>
+              </a:solidFill>
+            </a:ln>
+          </p:spPr>
+          <p:style>
+            <a:lnRef idx="2">
+              <a:schemeClr val="accent1">
+                <a:shade val="50000"/>
+              </a:schemeClr>
+            </a:lnRef>
+            <a:fillRef idx="1">
+              <a:schemeClr val="accent1"/>
+            </a:fillRef>
+            <a:effectRef idx="0">
+              <a:schemeClr val="accent1"/>
+            </a:effectRef>
+            <a:fontRef idx="minor">
+              <a:schemeClr val="lt1"/>
+            </a:fontRef>
+          </p:style>
+          <p:txBody>
+            <a:bodyPr rot="0" spcFirstLastPara="0" vertOverflow="overflow" horzOverflow="overflow" vert="horz" wrap="square" lIns="457200" tIns="91440" rIns="91440" bIns="45720" numCol="1" spcCol="0" rtlCol="0" fromWordArt="0" anchor="t" anchorCtr="0" forceAA="0" compatLnSpc="1">
+              <a:prstTxWarp prst="textNoShape">
+                <a:avLst/>
+              </a:prstTxWarp>
+              <a:noAutofit/>
+            </a:bodyPr>
+            <a:lstStyle/>
+            <a:p>
+              <a:pPr algn="l"/>
+              <a:endParaRPr lang="en-US" sz="600" dirty="0">
+                <a:ln w="0"/>
+                <a:solidFill>
+                  <a:schemeClr val="accent5"/>
+                </a:solidFill>
+                <a:latin typeface="Amazon Ember" panose="020B0603020204020204" pitchFamily="34" charset="0"/>
+                <a:ea typeface="Amazon Ember" panose="020B0603020204020204" pitchFamily="34" charset="0"/>
+                <a:cs typeface="Amazon Ember" panose="020B0603020204020204" pitchFamily="34" charset="0"/>
+              </a:endParaRPr>
+            </a:p>
+          </p:txBody>
+        </p:sp>
+        <p:pic>
+          <p:nvPicPr>
+            <p:cNvPr id="160" name="Graphic 159">
+              <a:extLst>
+                <a:ext uri="{FF2B5EF4-FFF2-40B4-BE49-F238E27FC236}">
+                  <a16:creationId xmlns:a16="http://schemas.microsoft.com/office/drawing/2014/main" id="{CB481A98-010F-5EEE-6A99-ACBF112C7FCF}"/>
+                </a:ext>
+              </a:extLst>
+            </p:cNvPr>
+            <p:cNvPicPr>
+              <a:picLocks noChangeAspect="1"/>
+            </p:cNvPicPr>
+            <p:nvPr/>
+          </p:nvPicPr>
+          <p:blipFill>
+            <a:blip r:embed="rId8">
+              <a:extLst>
+                <a:ext uri="{96DAC541-7B7A-43D3-8B79-37D633B846F1}">
+                  <asvg:svgBlip xmlns:asvg="http://schemas.microsoft.com/office/drawing/2016/SVG/main" r:embed="rId9"/>
+                </a:ext>
+              </a:extLst>
+            </a:blip>
+            <a:stretch>
+              <a:fillRect/>
+            </a:stretch>
+          </p:blipFill>
+          <p:spPr>
+            <a:xfrm>
+              <a:off x="1756780" y="2275224"/>
+              <a:ext cx="197654" cy="197654"/>
+            </a:xfrm>
+            <a:prstGeom prst="rect">
+              <a:avLst/>
+            </a:prstGeom>
+          </p:spPr>
+        </p:pic>
+      </p:grpSp>
+      <p:cxnSp>
+        <p:nvCxnSpPr>
+          <p:cNvPr id="169" name="Straight Connector 168">
+            <a:extLst>
+              <a:ext uri="{FF2B5EF4-FFF2-40B4-BE49-F238E27FC236}">
+                <a16:creationId xmlns:a16="http://schemas.microsoft.com/office/drawing/2014/main" id="{AC47943F-4B93-401D-F62D-D2027C247F48}"/>
+              </a:ext>
+            </a:extLst>
+          </p:cNvPr>
+          <p:cNvCxnSpPr>
+            <a:cxnSpLocks/>
+            <a:stCxn id="159" idx="2"/>
+          </p:cNvCxnSpPr>
+          <p:nvPr/>
+        </p:nvCxnSpPr>
+        <p:spPr>
+          <a:xfrm>
+            <a:off x="2565858" y="1985558"/>
+            <a:ext cx="0" cy="276999"/>
+          </a:xfrm>
+          <a:prstGeom prst="line">
+            <a:avLst/>
+          </a:prstGeom>
+          <a:ln w="12700">
+            <a:solidFill>
+              <a:schemeClr val="accent5"/>
+            </a:solidFill>
+            <a:headEnd type="oval" w="med" len="med"/>
+            <a:tailEnd type="oval" w="med" len="med"/>
+          </a:ln>
+        </p:spPr>
+        <p:style>
+          <a:lnRef idx="1">
+            <a:schemeClr val="accent1"/>
+          </a:lnRef>
+          <a:fillRef idx="0">
+            <a:schemeClr val="accent1"/>
+          </a:fillRef>
+          <a:effectRef idx="0">
+            <a:schemeClr val="accent1"/>
+          </a:effectRef>
+          <a:fontRef idx="minor">
+            <a:schemeClr val="tx1"/>
+          </a:fontRef>
+        </p:style>
+      </p:cxnSp>
+      <p:cxnSp>
+        <p:nvCxnSpPr>
+          <p:cNvPr id="253" name="Straight Connector 252">
+            <a:extLst>
+              <a:ext uri="{FF2B5EF4-FFF2-40B4-BE49-F238E27FC236}">
+                <a16:creationId xmlns:a16="http://schemas.microsoft.com/office/drawing/2014/main" id="{FD4BEF27-3A52-7583-436C-295D1DC79D3D}"/>
+              </a:ext>
+            </a:extLst>
+          </p:cNvPr>
+          <p:cNvCxnSpPr>
+            <a:cxnSpLocks/>
+            <a:stCxn id="36" idx="2"/>
+          </p:cNvCxnSpPr>
+          <p:nvPr/>
+        </p:nvCxnSpPr>
+        <p:spPr>
+          <a:xfrm>
+            <a:off x="5580645" y="1980714"/>
+            <a:ext cx="0" cy="273342"/>
+          </a:xfrm>
+          <a:prstGeom prst="line">
+            <a:avLst/>
+          </a:prstGeom>
+          <a:ln w="12700">
+            <a:solidFill>
+              <a:schemeClr val="accent5"/>
+            </a:solidFill>
+            <a:headEnd type="oval" w="med" len="med"/>
+            <a:tailEnd type="oval" w="med" len="med"/>
+          </a:ln>
+        </p:spPr>
+        <p:style>
+          <a:lnRef idx="1">
+            <a:schemeClr val="accent1"/>
+          </a:lnRef>
+          <a:fillRef idx="0">
+            <a:schemeClr val="accent1"/>
+          </a:fillRef>
+          <a:effectRef idx="0">
+            <a:schemeClr val="accent1"/>
+          </a:effectRef>
+          <a:fontRef idx="minor">
+            <a:schemeClr val="tx1"/>
+          </a:fontRef>
+        </p:style>
+      </p:cxnSp>
+      <p:grpSp>
+        <p:nvGrpSpPr>
+          <p:cNvPr id="2" name="Group 1">
+            <a:extLst>
+              <a:ext uri="{FF2B5EF4-FFF2-40B4-BE49-F238E27FC236}">
+                <a16:creationId xmlns:a16="http://schemas.microsoft.com/office/drawing/2014/main" id="{B06CF918-AD55-B0FC-E455-9CA97AAA443A}"/>
+              </a:ext>
+            </a:extLst>
+          </p:cNvPr>
+          <p:cNvGrpSpPr/>
+          <p:nvPr/>
+        </p:nvGrpSpPr>
+        <p:grpSpPr>
+          <a:xfrm>
+            <a:off x="3886429" y="1534398"/>
+            <a:ext cx="786158" cy="448841"/>
+            <a:chOff x="1754914" y="2163737"/>
+            <a:chExt cx="786158" cy="448841"/>
+          </a:xfrm>
+        </p:grpSpPr>
+        <p:sp>
+          <p:nvSpPr>
+            <p:cNvPr id="6" name="Rectangle 5">
+              <a:extLst>
+                <a:ext uri="{FF2B5EF4-FFF2-40B4-BE49-F238E27FC236}">
+                  <a16:creationId xmlns:a16="http://schemas.microsoft.com/office/drawing/2014/main" id="{B509F650-C572-AC9E-8482-18A1BAB62DE9}"/>
+                </a:ext>
+              </a:extLst>
+            </p:cNvPr>
+            <p:cNvSpPr/>
+            <p:nvPr/>
+          </p:nvSpPr>
+          <p:spPr>
+            <a:xfrm>
+              <a:off x="1754915" y="2163737"/>
+              <a:ext cx="760808" cy="448841"/>
+            </a:xfrm>
+            <a:prstGeom prst="rect">
+              <a:avLst/>
+            </a:prstGeom>
+            <a:noFill/>
+            <a:ln w="12700">
+              <a:solidFill>
+                <a:schemeClr val="accent5"/>
+              </a:solidFill>
+            </a:ln>
+          </p:spPr>
+          <p:style>
+            <a:lnRef idx="2">
+              <a:schemeClr val="accent1">
+                <a:shade val="50000"/>
+              </a:schemeClr>
+            </a:lnRef>
+            <a:fillRef idx="1">
+              <a:schemeClr val="accent1"/>
+            </a:fillRef>
+            <a:effectRef idx="0">
+              <a:schemeClr val="accent1"/>
+            </a:effectRef>
+            <a:fontRef idx="minor">
+              <a:schemeClr val="lt1"/>
+            </a:fontRef>
+          </p:style>
+          <p:txBody>
+            <a:bodyPr rot="0" spcFirstLastPara="0" vertOverflow="overflow" horzOverflow="overflow" vert="horz" wrap="square" lIns="457200" tIns="91440" rIns="91440" bIns="45720" numCol="1" spcCol="0" rtlCol="0" fromWordArt="0" anchor="t" anchorCtr="0" forceAA="0" compatLnSpc="1">
+              <a:prstTxWarp prst="textNoShape">
+                <a:avLst/>
+              </a:prstTxWarp>
+              <a:noAutofit/>
+            </a:bodyPr>
+            <a:lstStyle/>
+            <a:p>
+              <a:pPr algn="l"/>
+              <a:endParaRPr lang="en-US" sz="600" dirty="0">
+                <a:ln w="0"/>
+                <a:solidFill>
+                  <a:schemeClr val="accent5"/>
+                </a:solidFill>
+                <a:latin typeface="Amazon Ember" panose="020B0603020204020204" pitchFamily="34" charset="0"/>
+                <a:ea typeface="Amazon Ember" panose="020B0603020204020204" pitchFamily="34" charset="0"/>
+                <a:cs typeface="Amazon Ember" panose="020B0603020204020204" pitchFamily="34" charset="0"/>
+              </a:endParaRPr>
+            </a:p>
+          </p:txBody>
+        </p:sp>
+        <p:pic>
+          <p:nvPicPr>
+            <p:cNvPr id="7" name="Graphic 6">
+              <a:extLst>
+                <a:ext uri="{FF2B5EF4-FFF2-40B4-BE49-F238E27FC236}">
+                  <a16:creationId xmlns:a16="http://schemas.microsoft.com/office/drawing/2014/main" id="{80A8705F-89A6-DAF3-BABA-241ED997BBCE}"/>
+                </a:ext>
+              </a:extLst>
+            </p:cNvPr>
+            <p:cNvPicPr>
+              <a:picLocks noChangeAspect="1"/>
+            </p:cNvPicPr>
+            <p:nvPr/>
+          </p:nvPicPr>
+          <p:blipFill>
+            <a:blip r:embed="rId8">
+              <a:extLst>
+                <a:ext uri="{96DAC541-7B7A-43D3-8B79-37D633B846F1}">
+                  <asvg:svgBlip xmlns:asvg="http://schemas.microsoft.com/office/drawing/2016/SVG/main" r:embed="rId9"/>
+                </a:ext>
+              </a:extLst>
+            </a:blip>
+            <a:stretch>
+              <a:fillRect/>
+            </a:stretch>
+          </p:blipFill>
+          <p:spPr>
+            <a:xfrm>
+              <a:off x="1754914" y="2164546"/>
+              <a:ext cx="197654" cy="197654"/>
+            </a:xfrm>
+            <a:prstGeom prst="rect">
+              <a:avLst/>
+            </a:prstGeom>
+          </p:spPr>
+        </p:pic>
+        <p:sp>
+          <p:nvSpPr>
+            <p:cNvPr id="8" name="TextBox 7">
+              <a:extLst>
+                <a:ext uri="{FF2B5EF4-FFF2-40B4-BE49-F238E27FC236}">
+                  <a16:creationId xmlns:a16="http://schemas.microsoft.com/office/drawing/2014/main" id="{7E75D5C4-60F8-0A8C-2231-7733B1C0C928}"/>
+                </a:ext>
+              </a:extLst>
+            </p:cNvPr>
+            <p:cNvSpPr txBox="1"/>
+            <p:nvPr/>
+          </p:nvSpPr>
+          <p:spPr>
+            <a:xfrm>
+              <a:off x="1906706" y="2174072"/>
+              <a:ext cx="634366" cy="323165"/>
+            </a:xfrm>
+            <a:prstGeom prst="rect">
+              <a:avLst/>
+            </a:prstGeom>
+            <a:noFill/>
+          </p:spPr>
+          <p:txBody>
+            <a:bodyPr wrap="square">
+              <a:spAutoFit/>
+            </a:bodyPr>
+            <a:lstStyle/>
+            <a:p>
+              <a:pPr algn="l"/>
+              <a:r>
+                <a:rPr lang="en-US" sz="500" dirty="0">
+                  <a:ln w="0"/>
+                  <a:solidFill>
+                    <a:schemeClr val="accent5"/>
+                  </a:solidFill>
+                  <a:latin typeface="Amazon Ember" panose="020B0603020204020204" pitchFamily="34" charset="0"/>
+                  <a:ea typeface="Amazon Ember" panose="020B0603020204020204" pitchFamily="34" charset="0"/>
+                  <a:cs typeface="Amazon Ember" panose="020B0603020204020204" pitchFamily="34" charset="0"/>
+                </a:rPr>
+                <a:t>Outbound Inspection </a:t>
+              </a:r>
+            </a:p>
+            <a:p>
+              <a:pPr algn="l"/>
+              <a:r>
+                <a:rPr lang="en-US" sz="500" dirty="0">
+                  <a:ln w="0"/>
+                  <a:solidFill>
+                    <a:schemeClr val="accent5"/>
+                  </a:solidFill>
+                  <a:latin typeface="Amazon Ember" panose="020B0603020204020204" pitchFamily="34" charset="0"/>
+                  <a:ea typeface="Amazon Ember" panose="020B0603020204020204" pitchFamily="34" charset="0"/>
+                  <a:cs typeface="Amazon Ember" panose="020B0603020204020204" pitchFamily="34" charset="0"/>
+                </a:rPr>
+                <a:t>VPC Region1</a:t>
+              </a:r>
+            </a:p>
+          </p:txBody>
+        </p:sp>
+      </p:grpSp>
+      <p:grpSp>
+        <p:nvGrpSpPr>
+          <p:cNvPr id="12" name="Group 11">
+            <a:extLst>
+              <a:ext uri="{FF2B5EF4-FFF2-40B4-BE49-F238E27FC236}">
+                <a16:creationId xmlns:a16="http://schemas.microsoft.com/office/drawing/2014/main" id="{03E38FAD-6E05-D51E-2CAC-8743286B8341}"/>
+              </a:ext>
+            </a:extLst>
+          </p:cNvPr>
+          <p:cNvGrpSpPr/>
+          <p:nvPr/>
+        </p:nvGrpSpPr>
+        <p:grpSpPr>
+          <a:xfrm>
+            <a:off x="3095113" y="1664890"/>
+            <a:ext cx="528208" cy="322514"/>
+            <a:chOff x="1752297" y="2290064"/>
+            <a:chExt cx="528208" cy="322514"/>
+          </a:xfrm>
+        </p:grpSpPr>
+        <p:sp>
+          <p:nvSpPr>
+            <p:cNvPr id="15" name="Rectangle 14">
+              <a:extLst>
+                <a:ext uri="{FF2B5EF4-FFF2-40B4-BE49-F238E27FC236}">
+                  <a16:creationId xmlns:a16="http://schemas.microsoft.com/office/drawing/2014/main" id="{9936DA84-FDE9-F05F-8C1D-91BB606603B2}"/>
+                </a:ext>
+              </a:extLst>
+            </p:cNvPr>
+            <p:cNvSpPr/>
+            <p:nvPr/>
+          </p:nvSpPr>
+          <p:spPr>
+            <a:xfrm>
+              <a:off x="1754915" y="2290064"/>
+              <a:ext cx="525590" cy="322514"/>
+            </a:xfrm>
+            <a:prstGeom prst="rect">
+              <a:avLst/>
+            </a:prstGeom>
+            <a:noFill/>
+            <a:ln w="12700">
+              <a:solidFill>
+                <a:schemeClr val="accent5"/>
+              </a:solidFill>
+            </a:ln>
+          </p:spPr>
+          <p:style>
+            <a:lnRef idx="2">
+              <a:schemeClr val="accent1">
+                <a:shade val="50000"/>
+              </a:schemeClr>
+            </a:lnRef>
+            <a:fillRef idx="1">
+              <a:schemeClr val="accent1"/>
+            </a:fillRef>
+            <a:effectRef idx="0">
+              <a:schemeClr val="accent1"/>
+            </a:effectRef>
+            <a:fontRef idx="minor">
+              <a:schemeClr val="lt1"/>
+            </a:fontRef>
+          </p:style>
+          <p:txBody>
+            <a:bodyPr rot="0" spcFirstLastPara="0" vertOverflow="overflow" horzOverflow="overflow" vert="horz" wrap="square" lIns="457200" tIns="91440" rIns="91440" bIns="45720" numCol="1" spcCol="0" rtlCol="0" fromWordArt="0" anchor="t" anchorCtr="0" forceAA="0" compatLnSpc="1">
+              <a:prstTxWarp prst="textNoShape">
+                <a:avLst/>
+              </a:prstTxWarp>
+              <a:noAutofit/>
+            </a:bodyPr>
+            <a:lstStyle/>
+            <a:p>
+              <a:pPr algn="l"/>
+              <a:endParaRPr lang="en-US" sz="600" dirty="0">
+                <a:ln w="0"/>
+                <a:solidFill>
+                  <a:schemeClr val="accent5"/>
+                </a:solidFill>
+                <a:latin typeface="Amazon Ember" panose="020B0603020204020204" pitchFamily="34" charset="0"/>
+                <a:ea typeface="Amazon Ember" panose="020B0603020204020204" pitchFamily="34" charset="0"/>
+                <a:cs typeface="Amazon Ember" panose="020B0603020204020204" pitchFamily="34" charset="0"/>
+              </a:endParaRPr>
+            </a:p>
+          </p:txBody>
+        </p:sp>
+        <p:pic>
+          <p:nvPicPr>
+            <p:cNvPr id="16" name="Graphic 15">
+              <a:extLst>
+                <a:ext uri="{FF2B5EF4-FFF2-40B4-BE49-F238E27FC236}">
+                  <a16:creationId xmlns:a16="http://schemas.microsoft.com/office/drawing/2014/main" id="{D6552AAB-189B-33AA-973E-986213A43BBB}"/>
+                </a:ext>
+              </a:extLst>
+            </p:cNvPr>
+            <p:cNvPicPr>
+              <a:picLocks noChangeAspect="1"/>
+            </p:cNvPicPr>
+            <p:nvPr/>
+          </p:nvPicPr>
+          <p:blipFill>
+            <a:blip r:embed="rId8">
+              <a:extLst>
+                <a:ext uri="{96DAC541-7B7A-43D3-8B79-37D633B846F1}">
+                  <asvg:svgBlip xmlns:asvg="http://schemas.microsoft.com/office/drawing/2016/SVG/main" r:embed="rId9"/>
+                </a:ext>
+              </a:extLst>
+            </a:blip>
+            <a:stretch>
+              <a:fillRect/>
+            </a:stretch>
+          </p:blipFill>
+          <p:spPr>
+            <a:xfrm>
+              <a:off x="1752297" y="2290064"/>
+              <a:ext cx="197654" cy="197654"/>
+            </a:xfrm>
+            <a:prstGeom prst="rect">
+              <a:avLst/>
+            </a:prstGeom>
+          </p:spPr>
+        </p:pic>
+      </p:grpSp>
+      <p:sp>
+        <p:nvSpPr>
+          <p:cNvPr id="22" name="TextBox 21">
+            <a:extLst>
+              <a:ext uri="{FF2B5EF4-FFF2-40B4-BE49-F238E27FC236}">
+                <a16:creationId xmlns:a16="http://schemas.microsoft.com/office/drawing/2014/main" id="{640997CD-456E-4CCB-8416-DA553B9DE747}"/>
+              </a:ext>
+            </a:extLst>
+          </p:cNvPr>
+          <p:cNvSpPr txBox="1"/>
+          <p:nvPr/>
+        </p:nvSpPr>
+        <p:spPr>
+          <a:xfrm>
+            <a:off x="2447061" y="1653654"/>
+            <a:ext cx="419662" cy="276999"/>
+          </a:xfrm>
+          <a:prstGeom prst="rect">
+            <a:avLst/>
+          </a:prstGeom>
+          <a:noFill/>
+        </p:spPr>
+        <p:txBody>
+          <a:bodyPr wrap="square">
+            <a:spAutoFit/>
+          </a:bodyPr>
+          <a:lstStyle/>
+          <a:p>
+            <a:pPr algn="l"/>
+            <a:r>
+              <a:rPr lang="en-US" sz="600" dirty="0">
+                <a:ln w="0"/>
+                <a:solidFill>
+                  <a:schemeClr val="accent5"/>
+                </a:solidFill>
+                <a:latin typeface="Amazon Ember" panose="020B0603020204020204" pitchFamily="34" charset="0"/>
+                <a:ea typeface="Amazon Ember" panose="020B0603020204020204" pitchFamily="34" charset="0"/>
+                <a:cs typeface="Amazon Ember" panose="020B0603020204020204" pitchFamily="34" charset="0"/>
+              </a:rPr>
+              <a:t>VPC PROD</a:t>
+            </a:r>
+          </a:p>
+        </p:txBody>
+      </p:sp>
+      <p:sp>
+        <p:nvSpPr>
+          <p:cNvPr id="23" name="TextBox 22">
+            <a:extLst>
+              <a:ext uri="{FF2B5EF4-FFF2-40B4-BE49-F238E27FC236}">
+                <a16:creationId xmlns:a16="http://schemas.microsoft.com/office/drawing/2014/main" id="{04434C62-CB1E-DF28-2C00-112250F7023A}"/>
+              </a:ext>
+            </a:extLst>
+          </p:cNvPr>
+          <p:cNvSpPr txBox="1"/>
+          <p:nvPr/>
+        </p:nvSpPr>
+        <p:spPr>
+          <a:xfrm>
+            <a:off x="3225939" y="1638109"/>
+            <a:ext cx="469701" cy="276999"/>
+          </a:xfrm>
+          <a:prstGeom prst="rect">
+            <a:avLst/>
+          </a:prstGeom>
+          <a:noFill/>
+        </p:spPr>
+        <p:txBody>
+          <a:bodyPr wrap="square">
+            <a:spAutoFit/>
+          </a:bodyPr>
+          <a:lstStyle/>
+          <a:p>
+            <a:pPr algn="l"/>
+            <a:r>
+              <a:rPr lang="en-US" sz="600" dirty="0">
+                <a:ln w="0"/>
+                <a:solidFill>
+                  <a:schemeClr val="accent5"/>
+                </a:solidFill>
+                <a:latin typeface="Amazon Ember" panose="020B0603020204020204" pitchFamily="34" charset="0"/>
+                <a:ea typeface="Amazon Ember" panose="020B0603020204020204" pitchFamily="34" charset="0"/>
+                <a:cs typeface="Amazon Ember" panose="020B0603020204020204" pitchFamily="34" charset="0"/>
+              </a:rPr>
+              <a:t>VPC DEV</a:t>
+            </a:r>
+          </a:p>
+        </p:txBody>
+      </p:sp>
+      <p:grpSp>
+        <p:nvGrpSpPr>
+          <p:cNvPr id="35" name="Group 34">
+            <a:extLst>
+              <a:ext uri="{FF2B5EF4-FFF2-40B4-BE49-F238E27FC236}">
+                <a16:creationId xmlns:a16="http://schemas.microsoft.com/office/drawing/2014/main" id="{3394E507-E113-D096-81E2-7E5F9D8C3716}"/>
+              </a:ext>
+            </a:extLst>
+          </p:cNvPr>
+          <p:cNvGrpSpPr/>
+          <p:nvPr/>
+        </p:nvGrpSpPr>
+        <p:grpSpPr>
+          <a:xfrm>
+            <a:off x="5307772" y="1531873"/>
+            <a:ext cx="545745" cy="448841"/>
+            <a:chOff x="1754914" y="2163737"/>
+            <a:chExt cx="545745" cy="448841"/>
+          </a:xfrm>
+        </p:grpSpPr>
+        <p:sp>
+          <p:nvSpPr>
+            <p:cNvPr id="36" name="Rectangle 35">
+              <a:extLst>
+                <a:ext uri="{FF2B5EF4-FFF2-40B4-BE49-F238E27FC236}">
+                  <a16:creationId xmlns:a16="http://schemas.microsoft.com/office/drawing/2014/main" id="{626909CA-D208-C96F-F24C-97DAAA99EEC9}"/>
+                </a:ext>
+              </a:extLst>
+            </p:cNvPr>
+            <p:cNvSpPr/>
+            <p:nvPr/>
+          </p:nvSpPr>
+          <p:spPr>
+            <a:xfrm>
+              <a:off x="1754915" y="2163737"/>
+              <a:ext cx="545744" cy="448841"/>
+            </a:xfrm>
+            <a:prstGeom prst="rect">
+              <a:avLst/>
+            </a:prstGeom>
+            <a:noFill/>
+            <a:ln w="12700">
+              <a:solidFill>
+                <a:schemeClr val="accent5"/>
+              </a:solidFill>
+            </a:ln>
+          </p:spPr>
+          <p:style>
+            <a:lnRef idx="2">
+              <a:schemeClr val="accent1">
+                <a:shade val="50000"/>
+              </a:schemeClr>
+            </a:lnRef>
+            <a:fillRef idx="1">
+              <a:schemeClr val="accent1"/>
+            </a:fillRef>
+            <a:effectRef idx="0">
+              <a:schemeClr val="accent1"/>
+            </a:effectRef>
+            <a:fontRef idx="minor">
+              <a:schemeClr val="lt1"/>
+            </a:fontRef>
+          </p:style>
+          <p:txBody>
+            <a:bodyPr rot="0" spcFirstLastPara="0" vertOverflow="overflow" horzOverflow="overflow" vert="horz" wrap="square" lIns="457200" tIns="91440" rIns="91440" bIns="45720" numCol="1" spcCol="0" rtlCol="0" fromWordArt="0" anchor="t" anchorCtr="0" forceAA="0" compatLnSpc="1">
+              <a:prstTxWarp prst="textNoShape">
+                <a:avLst/>
+              </a:prstTxWarp>
+              <a:noAutofit/>
+            </a:bodyPr>
+            <a:lstStyle/>
+            <a:p>
+              <a:pPr algn="l"/>
+              <a:endParaRPr lang="en-US" sz="600" dirty="0">
+                <a:ln w="0"/>
+                <a:solidFill>
+                  <a:schemeClr val="accent5"/>
+                </a:solidFill>
+                <a:latin typeface="Amazon Ember" panose="020B0603020204020204" pitchFamily="34" charset="0"/>
+                <a:ea typeface="Amazon Ember" panose="020B0603020204020204" pitchFamily="34" charset="0"/>
+                <a:cs typeface="Amazon Ember" panose="020B0603020204020204" pitchFamily="34" charset="0"/>
+              </a:endParaRPr>
+            </a:p>
+          </p:txBody>
+        </p:sp>
+        <p:pic>
+          <p:nvPicPr>
+            <p:cNvPr id="37" name="Graphic 36">
+              <a:extLst>
+                <a:ext uri="{FF2B5EF4-FFF2-40B4-BE49-F238E27FC236}">
+                  <a16:creationId xmlns:a16="http://schemas.microsoft.com/office/drawing/2014/main" id="{292B9789-024E-4D27-C075-A939A3D6334D}"/>
+                </a:ext>
+              </a:extLst>
+            </p:cNvPr>
+            <p:cNvPicPr>
+              <a:picLocks noChangeAspect="1"/>
+            </p:cNvPicPr>
+            <p:nvPr/>
+          </p:nvPicPr>
+          <p:blipFill>
+            <a:blip r:embed="rId8">
+              <a:extLst>
+                <a:ext uri="{96DAC541-7B7A-43D3-8B79-37D633B846F1}">
+                  <asvg:svgBlip xmlns:asvg="http://schemas.microsoft.com/office/drawing/2016/SVG/main" r:embed="rId9"/>
+                </a:ext>
+              </a:extLst>
+            </a:blip>
+            <a:stretch>
+              <a:fillRect/>
+            </a:stretch>
+          </p:blipFill>
+          <p:spPr>
+            <a:xfrm>
+              <a:off x="1754914" y="2164546"/>
+              <a:ext cx="197654" cy="197654"/>
+            </a:xfrm>
+            <a:prstGeom prst="rect">
+              <a:avLst/>
+            </a:prstGeom>
+          </p:spPr>
+        </p:pic>
+      </p:grpSp>
+      <p:sp>
+        <p:nvSpPr>
+          <p:cNvPr id="38" name="TextBox 37">
+            <a:extLst>
+              <a:ext uri="{FF2B5EF4-FFF2-40B4-BE49-F238E27FC236}">
+                <a16:creationId xmlns:a16="http://schemas.microsoft.com/office/drawing/2014/main" id="{D1971F3E-F06F-3E3A-6CF6-1576FE51788B}"/>
+              </a:ext>
+            </a:extLst>
+          </p:cNvPr>
+          <p:cNvSpPr txBox="1"/>
+          <p:nvPr/>
+        </p:nvSpPr>
+        <p:spPr>
+          <a:xfrm>
+            <a:off x="5454094" y="1538303"/>
+            <a:ext cx="423005" cy="276999"/>
+          </a:xfrm>
+          <a:prstGeom prst="rect">
+            <a:avLst/>
+          </a:prstGeom>
+          <a:noFill/>
+        </p:spPr>
+        <p:txBody>
+          <a:bodyPr wrap="square">
+            <a:spAutoFit/>
+          </a:bodyPr>
+          <a:lstStyle/>
+          <a:p>
+            <a:pPr algn="l"/>
+            <a:r>
+              <a:rPr lang="en-US" sz="600" dirty="0">
+                <a:ln w="0"/>
+                <a:solidFill>
+                  <a:schemeClr val="accent5"/>
+                </a:solidFill>
+                <a:latin typeface="Amazon Ember" panose="020B0603020204020204" pitchFamily="34" charset="0"/>
+                <a:ea typeface="Amazon Ember" panose="020B0603020204020204" pitchFamily="34" charset="0"/>
+                <a:cs typeface="Amazon Ember" panose="020B0603020204020204" pitchFamily="34" charset="0"/>
+              </a:rPr>
+              <a:t>VPC PROD</a:t>
+            </a:r>
+          </a:p>
+        </p:txBody>
+      </p:sp>
+      <p:grpSp>
+        <p:nvGrpSpPr>
+          <p:cNvPr id="41" name="Group 40">
+            <a:extLst>
+              <a:ext uri="{FF2B5EF4-FFF2-40B4-BE49-F238E27FC236}">
+                <a16:creationId xmlns:a16="http://schemas.microsoft.com/office/drawing/2014/main" id="{0DE6915B-47E9-FA0B-26A3-EA3B3244F7CB}"/>
+              </a:ext>
+            </a:extLst>
+          </p:cNvPr>
+          <p:cNvGrpSpPr/>
+          <p:nvPr/>
+        </p:nvGrpSpPr>
+        <p:grpSpPr>
+          <a:xfrm>
+            <a:off x="8007049" y="1529432"/>
+            <a:ext cx="549927" cy="448841"/>
+            <a:chOff x="1754914" y="2163737"/>
+            <a:chExt cx="549927" cy="448841"/>
+          </a:xfrm>
+        </p:grpSpPr>
+        <p:sp>
+          <p:nvSpPr>
+            <p:cNvPr id="42" name="Rectangle 41">
+              <a:extLst>
+                <a:ext uri="{FF2B5EF4-FFF2-40B4-BE49-F238E27FC236}">
+                  <a16:creationId xmlns:a16="http://schemas.microsoft.com/office/drawing/2014/main" id="{58905150-FC1F-E9C9-79FB-5853FA6C04A4}"/>
+                </a:ext>
+              </a:extLst>
+            </p:cNvPr>
+            <p:cNvSpPr/>
+            <p:nvPr/>
+          </p:nvSpPr>
+          <p:spPr>
+            <a:xfrm>
+              <a:off x="1754914" y="2163737"/>
+              <a:ext cx="549927" cy="448841"/>
+            </a:xfrm>
+            <a:prstGeom prst="rect">
+              <a:avLst/>
+            </a:prstGeom>
+            <a:noFill/>
+            <a:ln w="12700">
+              <a:solidFill>
+                <a:schemeClr val="accent5"/>
+              </a:solidFill>
+            </a:ln>
+          </p:spPr>
+          <p:style>
+            <a:lnRef idx="2">
+              <a:schemeClr val="accent1">
+                <a:shade val="50000"/>
+              </a:schemeClr>
+            </a:lnRef>
+            <a:fillRef idx="1">
+              <a:schemeClr val="accent1"/>
+            </a:fillRef>
+            <a:effectRef idx="0">
+              <a:schemeClr val="accent1"/>
+            </a:effectRef>
+            <a:fontRef idx="minor">
+              <a:schemeClr val="lt1"/>
+            </a:fontRef>
+          </p:style>
+          <p:txBody>
+            <a:bodyPr rot="0" spcFirstLastPara="0" vertOverflow="overflow" horzOverflow="overflow" vert="horz" wrap="square" lIns="457200" tIns="91440" rIns="91440" bIns="45720" numCol="1" spcCol="0" rtlCol="0" fromWordArt="0" anchor="t" anchorCtr="0" forceAA="0" compatLnSpc="1">
+              <a:prstTxWarp prst="textNoShape">
+                <a:avLst/>
+              </a:prstTxWarp>
+              <a:noAutofit/>
+            </a:bodyPr>
+            <a:lstStyle/>
+            <a:p>
+              <a:pPr algn="l"/>
+              <a:endParaRPr lang="en-US" sz="600" dirty="0">
+                <a:ln w="0"/>
+                <a:solidFill>
+                  <a:schemeClr val="accent5"/>
+                </a:solidFill>
+                <a:latin typeface="Amazon Ember" panose="020B0603020204020204" pitchFamily="34" charset="0"/>
+                <a:ea typeface="Amazon Ember" panose="020B0603020204020204" pitchFamily="34" charset="0"/>
+                <a:cs typeface="Amazon Ember" panose="020B0603020204020204" pitchFamily="34" charset="0"/>
+              </a:endParaRPr>
+            </a:p>
+          </p:txBody>
+        </p:sp>
+        <p:pic>
+          <p:nvPicPr>
+            <p:cNvPr id="43" name="Graphic 42">
+              <a:extLst>
+                <a:ext uri="{FF2B5EF4-FFF2-40B4-BE49-F238E27FC236}">
+                  <a16:creationId xmlns:a16="http://schemas.microsoft.com/office/drawing/2014/main" id="{2EC4E218-D722-EADA-F3C7-1D91FB152A82}"/>
+                </a:ext>
+              </a:extLst>
+            </p:cNvPr>
+            <p:cNvPicPr>
+              <a:picLocks noChangeAspect="1"/>
+            </p:cNvPicPr>
+            <p:nvPr/>
+          </p:nvPicPr>
+          <p:blipFill>
+            <a:blip r:embed="rId8">
+              <a:extLst>
+                <a:ext uri="{96DAC541-7B7A-43D3-8B79-37D633B846F1}">
+                  <asvg:svgBlip xmlns:asvg="http://schemas.microsoft.com/office/drawing/2016/SVG/main" r:embed="rId9"/>
+                </a:ext>
+              </a:extLst>
+            </a:blip>
+            <a:stretch>
+              <a:fillRect/>
+            </a:stretch>
+          </p:blipFill>
+          <p:spPr>
+            <a:xfrm>
+              <a:off x="1754914" y="2164546"/>
+              <a:ext cx="197654" cy="197654"/>
+            </a:xfrm>
+            <a:prstGeom prst="rect">
+              <a:avLst/>
+            </a:prstGeom>
+          </p:spPr>
+        </p:pic>
+      </p:grpSp>
+      <p:sp>
+        <p:nvSpPr>
+          <p:cNvPr id="46" name="TextBox 45">
+            <a:extLst>
+              <a:ext uri="{FF2B5EF4-FFF2-40B4-BE49-F238E27FC236}">
+                <a16:creationId xmlns:a16="http://schemas.microsoft.com/office/drawing/2014/main" id="{7204F683-52AA-4BE7-7509-4E0B656C36CF}"/>
+              </a:ext>
+            </a:extLst>
+          </p:cNvPr>
+          <p:cNvSpPr txBox="1"/>
+          <p:nvPr/>
+        </p:nvSpPr>
+        <p:spPr>
+          <a:xfrm>
+            <a:off x="8149399" y="1509421"/>
+            <a:ext cx="343252" cy="276999"/>
+          </a:xfrm>
+          <a:prstGeom prst="rect">
+            <a:avLst/>
+          </a:prstGeom>
+          <a:noFill/>
+        </p:spPr>
+        <p:txBody>
+          <a:bodyPr wrap="square">
+            <a:spAutoFit/>
+          </a:bodyPr>
+          <a:lstStyle/>
+          <a:p>
+            <a:pPr algn="l"/>
+            <a:r>
+              <a:rPr lang="en-US" sz="600" dirty="0">
+                <a:ln w="0"/>
+                <a:solidFill>
+                  <a:schemeClr val="accent5"/>
+                </a:solidFill>
+                <a:latin typeface="Amazon Ember" panose="020B0603020204020204" pitchFamily="34" charset="0"/>
+                <a:ea typeface="Amazon Ember" panose="020B0603020204020204" pitchFamily="34" charset="0"/>
+                <a:cs typeface="Amazon Ember" panose="020B0603020204020204" pitchFamily="34" charset="0"/>
+              </a:rPr>
+              <a:t>VPC</a:t>
+            </a:r>
+          </a:p>
+          <a:p>
+            <a:pPr algn="l"/>
+            <a:r>
+              <a:rPr lang="en-US" sz="600" dirty="0">
+                <a:ln w="0"/>
+                <a:solidFill>
+                  <a:schemeClr val="accent5"/>
+                </a:solidFill>
+                <a:latin typeface="Amazon Ember" panose="020B0603020204020204" pitchFamily="34" charset="0"/>
+                <a:ea typeface="Amazon Ember" panose="020B0603020204020204" pitchFamily="34" charset="0"/>
+                <a:cs typeface="Amazon Ember" panose="020B0603020204020204" pitchFamily="34" charset="0"/>
+              </a:rPr>
+              <a:t>DEV</a:t>
+            </a:r>
+          </a:p>
+        </p:txBody>
+      </p:sp>
+      <p:grpSp>
+        <p:nvGrpSpPr>
+          <p:cNvPr id="48" name="Group 47">
+            <a:extLst>
+              <a:ext uri="{FF2B5EF4-FFF2-40B4-BE49-F238E27FC236}">
+                <a16:creationId xmlns:a16="http://schemas.microsoft.com/office/drawing/2014/main" id="{D8582DA4-99FB-7471-56D6-A3F14913EE60}"/>
+              </a:ext>
+            </a:extLst>
+          </p:cNvPr>
+          <p:cNvGrpSpPr/>
+          <p:nvPr/>
+        </p:nvGrpSpPr>
+        <p:grpSpPr>
+          <a:xfrm>
+            <a:off x="6476754" y="1528800"/>
+            <a:ext cx="812766" cy="448841"/>
+            <a:chOff x="1754914" y="2163737"/>
+            <a:chExt cx="812766" cy="448841"/>
+          </a:xfrm>
+        </p:grpSpPr>
+        <p:sp>
+          <p:nvSpPr>
+            <p:cNvPr id="49" name="Rectangle 48">
+              <a:extLst>
+                <a:ext uri="{FF2B5EF4-FFF2-40B4-BE49-F238E27FC236}">
+                  <a16:creationId xmlns:a16="http://schemas.microsoft.com/office/drawing/2014/main" id="{7FB13348-92C9-3405-D608-475724718376}"/>
+                </a:ext>
+              </a:extLst>
+            </p:cNvPr>
+            <p:cNvSpPr/>
+            <p:nvPr/>
+          </p:nvSpPr>
+          <p:spPr>
+            <a:xfrm>
+              <a:off x="1754915" y="2163737"/>
+              <a:ext cx="760808" cy="448841"/>
+            </a:xfrm>
+            <a:prstGeom prst="rect">
+              <a:avLst/>
+            </a:prstGeom>
+            <a:noFill/>
+            <a:ln w="12700">
+              <a:solidFill>
+                <a:schemeClr val="accent5"/>
+              </a:solidFill>
+            </a:ln>
+          </p:spPr>
+          <p:style>
+            <a:lnRef idx="2">
+              <a:schemeClr val="accent1">
+                <a:shade val="50000"/>
+              </a:schemeClr>
+            </a:lnRef>
+            <a:fillRef idx="1">
+              <a:schemeClr val="accent1"/>
+            </a:fillRef>
+            <a:effectRef idx="0">
+              <a:schemeClr val="accent1"/>
+            </a:effectRef>
+            <a:fontRef idx="minor">
+              <a:schemeClr val="lt1"/>
+            </a:fontRef>
+          </p:style>
+          <p:txBody>
+            <a:bodyPr rot="0" spcFirstLastPara="0" vertOverflow="overflow" horzOverflow="overflow" vert="horz" wrap="square" lIns="457200" tIns="91440" rIns="91440" bIns="45720" numCol="1" spcCol="0" rtlCol="0" fromWordArt="0" anchor="t" anchorCtr="0" forceAA="0" compatLnSpc="1">
+              <a:prstTxWarp prst="textNoShape">
+                <a:avLst/>
+              </a:prstTxWarp>
+              <a:noAutofit/>
+            </a:bodyPr>
+            <a:lstStyle/>
+            <a:p>
+              <a:pPr algn="l"/>
+              <a:endParaRPr lang="en-US" sz="600" dirty="0">
+                <a:ln w="0"/>
+                <a:solidFill>
+                  <a:schemeClr val="accent5"/>
+                </a:solidFill>
+                <a:latin typeface="Amazon Ember" panose="020B0603020204020204" pitchFamily="34" charset="0"/>
+                <a:ea typeface="Amazon Ember" panose="020B0603020204020204" pitchFamily="34" charset="0"/>
+                <a:cs typeface="Amazon Ember" panose="020B0603020204020204" pitchFamily="34" charset="0"/>
+              </a:endParaRPr>
+            </a:p>
+          </p:txBody>
+        </p:sp>
+        <p:pic>
+          <p:nvPicPr>
+            <p:cNvPr id="50" name="Graphic 49">
+              <a:extLst>
+                <a:ext uri="{FF2B5EF4-FFF2-40B4-BE49-F238E27FC236}">
+                  <a16:creationId xmlns:a16="http://schemas.microsoft.com/office/drawing/2014/main" id="{C8F00142-A9D6-EDE3-A076-17D658AE7827}"/>
+                </a:ext>
+              </a:extLst>
+            </p:cNvPr>
+            <p:cNvPicPr>
+              <a:picLocks noChangeAspect="1"/>
+            </p:cNvPicPr>
+            <p:nvPr/>
+          </p:nvPicPr>
+          <p:blipFill>
+            <a:blip r:embed="rId8">
+              <a:extLst>
+                <a:ext uri="{96DAC541-7B7A-43D3-8B79-37D633B846F1}">
+                  <asvg:svgBlip xmlns:asvg="http://schemas.microsoft.com/office/drawing/2016/SVG/main" r:embed="rId9"/>
+                </a:ext>
+              </a:extLst>
+            </a:blip>
+            <a:stretch>
+              <a:fillRect/>
+            </a:stretch>
+          </p:blipFill>
+          <p:spPr>
+            <a:xfrm>
+              <a:off x="1754914" y="2164546"/>
+              <a:ext cx="197654" cy="197654"/>
+            </a:xfrm>
+            <a:prstGeom prst="rect">
+              <a:avLst/>
+            </a:prstGeom>
+          </p:spPr>
+        </p:pic>
+        <p:sp>
+          <p:nvSpPr>
+            <p:cNvPr id="51" name="TextBox 50">
+              <a:extLst>
+                <a:ext uri="{FF2B5EF4-FFF2-40B4-BE49-F238E27FC236}">
+                  <a16:creationId xmlns:a16="http://schemas.microsoft.com/office/drawing/2014/main" id="{90800C30-F246-70CB-5BAD-8DFDFA04F11E}"/>
+                </a:ext>
+              </a:extLst>
+            </p:cNvPr>
+            <p:cNvSpPr txBox="1"/>
+            <p:nvPr/>
+          </p:nvSpPr>
+          <p:spPr>
+            <a:xfrm>
+              <a:off x="1906705" y="2174072"/>
+              <a:ext cx="660975" cy="369332"/>
+            </a:xfrm>
+            <a:prstGeom prst="rect">
+              <a:avLst/>
+            </a:prstGeom>
+            <a:noFill/>
+          </p:spPr>
+          <p:txBody>
+            <a:bodyPr wrap="square">
+              <a:spAutoFit/>
+            </a:bodyPr>
+            <a:lstStyle/>
+            <a:p>
+              <a:pPr algn="l"/>
+              <a:r>
+                <a:rPr lang="en-US" sz="600" dirty="0">
+                  <a:ln w="0"/>
+                  <a:solidFill>
+                    <a:schemeClr val="accent5"/>
+                  </a:solidFill>
+                  <a:latin typeface="Amazon Ember" panose="020B0603020204020204" pitchFamily="34" charset="0"/>
+                  <a:ea typeface="Amazon Ember" panose="020B0603020204020204" pitchFamily="34" charset="0"/>
+                  <a:cs typeface="Amazon Ember" panose="020B0603020204020204" pitchFamily="34" charset="0"/>
+                </a:rPr>
+                <a:t>Outbound Inspection </a:t>
+              </a:r>
+            </a:p>
+            <a:p>
+              <a:pPr algn="l"/>
+              <a:r>
+                <a:rPr lang="en-US" sz="600" dirty="0">
+                  <a:ln w="0"/>
+                  <a:solidFill>
+                    <a:schemeClr val="accent5"/>
+                  </a:solidFill>
+                  <a:latin typeface="Amazon Ember" panose="020B0603020204020204" pitchFamily="34" charset="0"/>
+                  <a:ea typeface="Amazon Ember" panose="020B0603020204020204" pitchFamily="34" charset="0"/>
+                  <a:cs typeface="Amazon Ember" panose="020B0603020204020204" pitchFamily="34" charset="0"/>
+                </a:rPr>
+                <a:t>VPC Region 2</a:t>
+              </a:r>
+            </a:p>
+          </p:txBody>
+        </p:sp>
+      </p:grpSp>
+      <p:grpSp>
+        <p:nvGrpSpPr>
+          <p:cNvPr id="52" name="Group 51">
+            <a:extLst>
+              <a:ext uri="{FF2B5EF4-FFF2-40B4-BE49-F238E27FC236}">
+                <a16:creationId xmlns:a16="http://schemas.microsoft.com/office/drawing/2014/main" id="{1EA77F5D-EFAD-671D-4F64-138DAD475C70}"/>
+              </a:ext>
+            </a:extLst>
+          </p:cNvPr>
+          <p:cNvGrpSpPr/>
+          <p:nvPr/>
+        </p:nvGrpSpPr>
+        <p:grpSpPr>
+          <a:xfrm>
+            <a:off x="9123381" y="1511655"/>
+            <a:ext cx="812766" cy="448841"/>
+            <a:chOff x="1754914" y="2163737"/>
+            <a:chExt cx="812766" cy="448841"/>
+          </a:xfrm>
+        </p:grpSpPr>
+        <p:sp>
+          <p:nvSpPr>
+            <p:cNvPr id="53" name="Rectangle 52">
+              <a:extLst>
+                <a:ext uri="{FF2B5EF4-FFF2-40B4-BE49-F238E27FC236}">
+                  <a16:creationId xmlns:a16="http://schemas.microsoft.com/office/drawing/2014/main" id="{559DAC7A-4777-E706-0EA0-2A4E72801385}"/>
+                </a:ext>
+              </a:extLst>
+            </p:cNvPr>
+            <p:cNvSpPr/>
+            <p:nvPr/>
+          </p:nvSpPr>
+          <p:spPr>
+            <a:xfrm>
+              <a:off x="1754915" y="2163737"/>
+              <a:ext cx="760808" cy="448841"/>
+            </a:xfrm>
+            <a:prstGeom prst="rect">
+              <a:avLst/>
+            </a:prstGeom>
+            <a:noFill/>
+            <a:ln w="12700">
+              <a:solidFill>
+                <a:schemeClr val="accent5"/>
+              </a:solidFill>
+            </a:ln>
+          </p:spPr>
+          <p:style>
+            <a:lnRef idx="2">
+              <a:schemeClr val="accent1">
+                <a:shade val="50000"/>
+              </a:schemeClr>
+            </a:lnRef>
+            <a:fillRef idx="1">
+              <a:schemeClr val="accent1"/>
+            </a:fillRef>
+            <a:effectRef idx="0">
+              <a:schemeClr val="accent1"/>
+            </a:effectRef>
+            <a:fontRef idx="minor">
+              <a:schemeClr val="lt1"/>
+            </a:fontRef>
+          </p:style>
+          <p:txBody>
+            <a:bodyPr rot="0" spcFirstLastPara="0" vertOverflow="overflow" horzOverflow="overflow" vert="horz" wrap="square" lIns="457200" tIns="91440" rIns="91440" bIns="45720" numCol="1" spcCol="0" rtlCol="0" fromWordArt="0" anchor="t" anchorCtr="0" forceAA="0" compatLnSpc="1">
+              <a:prstTxWarp prst="textNoShape">
+                <a:avLst/>
+              </a:prstTxWarp>
+              <a:noAutofit/>
+            </a:bodyPr>
+            <a:lstStyle/>
+            <a:p>
+              <a:pPr algn="l"/>
+              <a:endParaRPr lang="en-US" sz="600" dirty="0">
+                <a:ln w="0"/>
+                <a:solidFill>
+                  <a:schemeClr val="accent5"/>
+                </a:solidFill>
+                <a:latin typeface="Amazon Ember" panose="020B0603020204020204" pitchFamily="34" charset="0"/>
+                <a:ea typeface="Amazon Ember" panose="020B0603020204020204" pitchFamily="34" charset="0"/>
+                <a:cs typeface="Amazon Ember" panose="020B0603020204020204" pitchFamily="34" charset="0"/>
+              </a:endParaRPr>
+            </a:p>
+          </p:txBody>
+        </p:sp>
+        <p:pic>
+          <p:nvPicPr>
+            <p:cNvPr id="54" name="Graphic 53">
+              <a:extLst>
+                <a:ext uri="{FF2B5EF4-FFF2-40B4-BE49-F238E27FC236}">
+                  <a16:creationId xmlns:a16="http://schemas.microsoft.com/office/drawing/2014/main" id="{2331106D-ACFC-7601-E0D9-F1AE93AD0699}"/>
+                </a:ext>
+              </a:extLst>
+            </p:cNvPr>
+            <p:cNvPicPr>
+              <a:picLocks noChangeAspect="1"/>
+            </p:cNvPicPr>
+            <p:nvPr/>
+          </p:nvPicPr>
+          <p:blipFill>
+            <a:blip r:embed="rId8">
+              <a:extLst>
+                <a:ext uri="{96DAC541-7B7A-43D3-8B79-37D633B846F1}">
+                  <asvg:svgBlip xmlns:asvg="http://schemas.microsoft.com/office/drawing/2016/SVG/main" r:embed="rId9"/>
+                </a:ext>
+              </a:extLst>
+            </a:blip>
+            <a:stretch>
+              <a:fillRect/>
+            </a:stretch>
+          </p:blipFill>
+          <p:spPr>
+            <a:xfrm>
+              <a:off x="1754914" y="2164546"/>
+              <a:ext cx="197654" cy="197654"/>
+            </a:xfrm>
+            <a:prstGeom prst="rect">
+              <a:avLst/>
+            </a:prstGeom>
+          </p:spPr>
+        </p:pic>
+        <p:sp>
+          <p:nvSpPr>
+            <p:cNvPr id="55" name="TextBox 54">
+              <a:extLst>
+                <a:ext uri="{FF2B5EF4-FFF2-40B4-BE49-F238E27FC236}">
+                  <a16:creationId xmlns:a16="http://schemas.microsoft.com/office/drawing/2014/main" id="{FDB2DF8F-8749-CBC9-4FEB-AA2F3C39F284}"/>
+                </a:ext>
+              </a:extLst>
+            </p:cNvPr>
+            <p:cNvSpPr txBox="1"/>
+            <p:nvPr/>
+          </p:nvSpPr>
+          <p:spPr>
+            <a:xfrm>
+              <a:off x="1906705" y="2174072"/>
+              <a:ext cx="660975" cy="369332"/>
+            </a:xfrm>
+            <a:prstGeom prst="rect">
+              <a:avLst/>
+            </a:prstGeom>
+            <a:noFill/>
+          </p:spPr>
+          <p:txBody>
+            <a:bodyPr wrap="square">
+              <a:spAutoFit/>
+            </a:bodyPr>
+            <a:lstStyle/>
+            <a:p>
+              <a:pPr algn="l"/>
+              <a:r>
+                <a:rPr lang="en-US" sz="600" dirty="0">
+                  <a:ln w="0"/>
+                  <a:solidFill>
+                    <a:schemeClr val="accent5"/>
+                  </a:solidFill>
+                  <a:latin typeface="Amazon Ember" panose="020B0603020204020204" pitchFamily="34" charset="0"/>
+                  <a:ea typeface="Amazon Ember" panose="020B0603020204020204" pitchFamily="34" charset="0"/>
+                  <a:cs typeface="Amazon Ember" panose="020B0603020204020204" pitchFamily="34" charset="0"/>
+                </a:rPr>
+                <a:t>Outbound Inspection </a:t>
+              </a:r>
+            </a:p>
+            <a:p>
+              <a:pPr algn="l"/>
+              <a:r>
+                <a:rPr lang="en-US" sz="600" dirty="0">
+                  <a:ln w="0"/>
+                  <a:solidFill>
+                    <a:schemeClr val="accent5"/>
+                  </a:solidFill>
+                  <a:latin typeface="Amazon Ember" panose="020B0603020204020204" pitchFamily="34" charset="0"/>
+                  <a:ea typeface="Amazon Ember" panose="020B0603020204020204" pitchFamily="34" charset="0"/>
+                  <a:cs typeface="Amazon Ember" panose="020B0603020204020204" pitchFamily="34" charset="0"/>
+                </a:rPr>
+                <a:t>VPC Region 3</a:t>
+              </a:r>
+            </a:p>
+          </p:txBody>
+        </p:sp>
+      </p:grpSp>
+      <p:sp>
+        <p:nvSpPr>
+          <p:cNvPr id="33" name="Rounded Rectangle 32">
+            <a:extLst>
+              <a:ext uri="{FF2B5EF4-FFF2-40B4-BE49-F238E27FC236}">
+                <a16:creationId xmlns:a16="http://schemas.microsoft.com/office/drawing/2014/main" id="{A531966A-8D04-C403-3145-90CF73BE1289}"/>
+              </a:ext>
+            </a:extLst>
+          </p:cNvPr>
+          <p:cNvSpPr/>
+          <p:nvPr/>
+        </p:nvSpPr>
+        <p:spPr>
+          <a:xfrm>
+            <a:off x="2328613" y="3352800"/>
+            <a:ext cx="7644397" cy="1065202"/>
+          </a:xfrm>
+          <a:prstGeom prst="roundRect">
+            <a:avLst/>
+          </a:prstGeom>
+          <a:solidFill>
+            <a:schemeClr val="accent3">
+              <a:lumMod val="20000"/>
+              <a:lumOff val="80000"/>
+            </a:schemeClr>
+          </a:solidFill>
+          <a:ln>
+            <a:solidFill>
+              <a:srgbClr val="7030A0"/>
+            </a:solidFill>
+          </a:ln>
+        </p:spPr>
+        <p:style>
+          <a:lnRef idx="2">
+            <a:schemeClr val="accent1">
+              <a:shade val="50000"/>
+            </a:schemeClr>
+          </a:lnRef>
+          <a:fillRef idx="1">
+            <a:schemeClr val="accent1"/>
+          </a:fillRef>
+          <a:effectRef idx="0">
+            <a:schemeClr val="accent1"/>
+          </a:effectRef>
+          <a:fontRef idx="minor">
+            <a:schemeClr val="lt1"/>
+          </a:fontRef>
+        </p:style>
+        <p:txBody>
+          <a:bodyPr vert="vert270" rtlCol="0" anchor="t"/>
+          <a:lstStyle/>
+          <a:p>
+            <a:pPr algn="ctr"/>
+            <a:r>
+              <a:rPr lang="en-US" sz="600" dirty="0">
+                <a:solidFill>
+                  <a:schemeClr val="tx1"/>
+                </a:solidFill>
+                <a:latin typeface="Amazon Ember" panose="020B0603020204020204" pitchFamily="34" charset="0"/>
+                <a:ea typeface="Amazon Ember" panose="020B0603020204020204" pitchFamily="34" charset="0"/>
+                <a:cs typeface="Amazon Ember" panose="020B0603020204020204" pitchFamily="34" charset="0"/>
+              </a:rPr>
+              <a:t>Development Segment</a:t>
+            </a:r>
+          </a:p>
+        </p:txBody>
+      </p:sp>
+      <p:graphicFrame>
+        <p:nvGraphicFramePr>
+          <p:cNvPr id="34" name="Table 47">
+            <a:extLst>
+              <a:ext uri="{FF2B5EF4-FFF2-40B4-BE49-F238E27FC236}">
+                <a16:creationId xmlns:a16="http://schemas.microsoft.com/office/drawing/2014/main" id="{CE31A2BA-0CEB-BB38-C085-421C437F8D67}"/>
+              </a:ext>
+            </a:extLst>
+          </p:cNvPr>
+          <p:cNvGraphicFramePr>
+            <a:graphicFrameLocks noGrp="1"/>
+          </p:cNvGraphicFramePr>
+          <p:nvPr>
+            <p:extLst>
+              <p:ext uri="{D42A27DB-BD31-4B8C-83A1-F6EECF244321}">
+                <p14:modId xmlns:p14="http://schemas.microsoft.com/office/powerpoint/2010/main" val="4276838318"/>
+              </p:ext>
+            </p:extLst>
+          </p:nvPr>
+        </p:nvGraphicFramePr>
+        <p:xfrm>
+          <a:off x="3519578" y="3545541"/>
+          <a:ext cx="4685123" cy="717600"/>
+        </p:xfrm>
+        <a:graphic>
+          <a:graphicData uri="http://schemas.openxmlformats.org/drawingml/2006/table">
+            <a:tbl>
+              <a:tblPr firstRow="1" bandRow="1">
+                <a:tableStyleId>{F5AB1C69-6EDB-4FF4-983F-18BD219EF322}</a:tableStyleId>
+              </a:tblPr>
+              <a:tblGrid>
+                <a:gridCol w="1675578">
+                  <a:extLst>
+                    <a:ext uri="{9D8B030D-6E8A-4147-A177-3AD203B41FA5}">
+                      <a16:colId xmlns:a16="http://schemas.microsoft.com/office/drawing/2014/main" val="1534408069"/>
+                    </a:ext>
+                  </a:extLst>
+                </a:gridCol>
+                <a:gridCol w="2277756">
+                  <a:extLst>
+                    <a:ext uri="{9D8B030D-6E8A-4147-A177-3AD203B41FA5}">
+                      <a16:colId xmlns:a16="http://schemas.microsoft.com/office/drawing/2014/main" val="200611525"/>
+                    </a:ext>
+                  </a:extLst>
+                </a:gridCol>
+                <a:gridCol w="731789">
+                  <a:extLst>
+                    <a:ext uri="{9D8B030D-6E8A-4147-A177-3AD203B41FA5}">
+                      <a16:colId xmlns:a16="http://schemas.microsoft.com/office/drawing/2014/main" val="4186196694"/>
+                    </a:ext>
+                  </a:extLst>
+                </a:gridCol>
+              </a:tblGrid>
+              <a:tr h="0">
+                <a:tc>
+                  <a:txBody>
+                    <a:bodyPr/>
+                    <a:lstStyle/>
+                    <a:p>
+                      <a:r>
+                        <a:rPr lang="en-US" sz="800" dirty="0">
+                          <a:latin typeface="+mn-lt"/>
+                        </a:rPr>
+                        <a:t>CIDR</a:t>
+                      </a:r>
+                    </a:p>
+                  </a:txBody>
+                  <a:tcPr marL="18000" marR="18000" marT="18000" marB="18000" anchor="ctr"/>
+                </a:tc>
+                <a:tc>
+                  <a:txBody>
+                    <a:bodyPr/>
+                    <a:lstStyle/>
+                    <a:p>
+                      <a:r>
+                        <a:rPr lang="en-US" sz="800" dirty="0">
+                          <a:latin typeface="+mn-lt"/>
+                        </a:rPr>
+                        <a:t>Destination</a:t>
+                      </a:r>
+                    </a:p>
+                  </a:txBody>
+                  <a:tcPr marL="18000" marR="18000" marT="18000" marB="18000" anchor="ctr"/>
+                </a:tc>
+                <a:tc>
+                  <a:txBody>
+                    <a:bodyPr/>
+                    <a:lstStyle/>
+                    <a:p>
+                      <a:r>
+                        <a:rPr lang="en-US" sz="800" dirty="0">
+                          <a:latin typeface="+mn-lt"/>
+                        </a:rPr>
+                        <a:t>Route type</a:t>
+                      </a:r>
+                    </a:p>
+                  </a:txBody>
+                  <a:tcPr marL="18000" marR="18000" marT="18000" marB="18000" anchor="ctr"/>
+                </a:tc>
+                <a:extLst>
+                  <a:ext uri="{0D108BD9-81ED-4DB2-BD59-A6C34878D82A}">
+                    <a16:rowId xmlns:a16="http://schemas.microsoft.com/office/drawing/2014/main" val="4239006478"/>
+                  </a:ext>
+                </a:extLst>
+              </a:tr>
+              <a:tr h="0">
+                <a:tc>
+                  <a:txBody>
+                    <a:bodyPr/>
+                    <a:lstStyle/>
+                    <a:p>
+                      <a:pPr marL="0" marR="0" lvl="0" indent="0" algn="l" defTabSz="914400" rtl="0" eaLnBrk="1" fontAlgn="auto" latinLnBrk="0" hangingPunct="1">
+                        <a:lnSpc>
+                          <a:spcPct val="100000"/>
+                        </a:lnSpc>
+                        <a:spcBef>
+                          <a:spcPts val="0"/>
+                        </a:spcBef>
+                        <a:spcAft>
+                          <a:spcPts val="0"/>
+                        </a:spcAft>
+                        <a:buClrTx/>
+                        <a:buSzTx/>
+                        <a:buFontTx/>
+                        <a:buNone/>
+                        <a:tabLst/>
+                        <a:defRPr/>
+                      </a:pPr>
+                      <a:r>
+                        <a:rPr lang="en-US" sz="800" dirty="0">
+                          <a:latin typeface="+mn-lt"/>
+                          <a:ea typeface="Amazon Ember" panose="020B0603020204020204" pitchFamily="34" charset="0"/>
+                          <a:cs typeface="Amazon Ember" panose="020B0603020204020204" pitchFamily="34" charset="0"/>
+                        </a:rPr>
+                        <a:t>DEV VPCs CIDRs (across all regions)</a:t>
+                      </a:r>
+                    </a:p>
+                  </a:txBody>
+                  <a:tcPr marL="18000" marR="18000" marT="18000" marB="18000" anchor="ctr"/>
+                </a:tc>
+                <a:tc>
+                  <a:txBody>
+                    <a:bodyPr/>
+                    <a:lstStyle/>
+                    <a:p>
+                      <a:pPr marL="0" marR="0" lvl="0" indent="0" algn="l" defTabSz="914400" rtl="0" eaLnBrk="1" fontAlgn="auto" latinLnBrk="0" hangingPunct="1">
+                        <a:lnSpc>
+                          <a:spcPct val="100000"/>
+                        </a:lnSpc>
+                        <a:spcBef>
+                          <a:spcPts val="0"/>
+                        </a:spcBef>
+                        <a:spcAft>
+                          <a:spcPts val="0"/>
+                        </a:spcAft>
+                        <a:buClrTx/>
+                        <a:buSzTx/>
+                        <a:buFontTx/>
+                        <a:buNone/>
+                        <a:tabLst/>
+                        <a:defRPr/>
+                      </a:pPr>
+                      <a:r>
+                        <a:rPr lang="en-US" sz="800" dirty="0">
+                          <a:latin typeface="+mn-lt"/>
+                          <a:ea typeface="Amazon Ember" panose="020B0603020204020204" pitchFamily="34" charset="0"/>
+                          <a:cs typeface="Amazon Ember" panose="020B0603020204020204" pitchFamily="34" charset="0"/>
+                        </a:rPr>
+                        <a:t>DEV VPCs attachments</a:t>
+                      </a:r>
+                    </a:p>
+                  </a:txBody>
+                  <a:tcPr marL="18000" marR="18000" marT="18000" marB="18000" anchor="ctr"/>
+                </a:tc>
+                <a:tc>
+                  <a:txBody>
+                    <a:bodyPr/>
+                    <a:lstStyle/>
+                    <a:p>
+                      <a:r>
+                        <a:rPr lang="en-US" sz="800" dirty="0">
+                          <a:latin typeface="+mn-lt"/>
+                        </a:rPr>
+                        <a:t>Propagated</a:t>
+                      </a:r>
+                    </a:p>
+                  </a:txBody>
+                  <a:tcPr marL="18000" marR="18000" marT="18000" marB="18000" anchor="ctr"/>
+                </a:tc>
+                <a:extLst>
+                  <a:ext uri="{0D108BD9-81ED-4DB2-BD59-A6C34878D82A}">
+                    <a16:rowId xmlns:a16="http://schemas.microsoft.com/office/drawing/2014/main" val="3992552590"/>
+                  </a:ext>
+                </a:extLst>
+              </a:tr>
+              <a:tr h="0">
+                <a:tc>
+                  <a:txBody>
+                    <a:bodyPr/>
+                    <a:lstStyle/>
+                    <a:p>
+                      <a:pPr marL="0" marR="0" lvl="0" indent="0" algn="l" defTabSz="914400" rtl="0" eaLnBrk="1" fontAlgn="auto" latinLnBrk="0" hangingPunct="1">
+                        <a:lnSpc>
+                          <a:spcPct val="100000"/>
+                        </a:lnSpc>
+                        <a:spcBef>
+                          <a:spcPts val="0"/>
+                        </a:spcBef>
+                        <a:spcAft>
+                          <a:spcPts val="0"/>
+                        </a:spcAft>
+                        <a:buClrTx/>
+                        <a:buSzTx/>
+                        <a:buFontTx/>
+                        <a:buNone/>
+                        <a:tabLst/>
+                        <a:defRPr/>
+                      </a:pPr>
+                      <a:r>
+                        <a:rPr lang="en-US" sz="800" b="1" dirty="0">
+                          <a:latin typeface="Amazon Ember" panose="020B0603020204020204" pitchFamily="34" charset="0"/>
+                          <a:ea typeface="Amazon Ember" panose="020B0603020204020204" pitchFamily="34" charset="0"/>
+                          <a:cs typeface="Amazon Ember" panose="020B0603020204020204" pitchFamily="34" charset="0"/>
+                        </a:rPr>
+                        <a:t>0.0.0.0/0</a:t>
+                      </a:r>
+                    </a:p>
+                    <a:p>
+                      <a:pPr marL="0" marR="0" lvl="0" indent="0" algn="l" defTabSz="914400" rtl="0" eaLnBrk="1" fontAlgn="auto" latinLnBrk="0" hangingPunct="1">
+                        <a:lnSpc>
+                          <a:spcPct val="100000"/>
+                        </a:lnSpc>
+                        <a:spcBef>
+                          <a:spcPts val="0"/>
+                        </a:spcBef>
+                        <a:spcAft>
+                          <a:spcPts val="0"/>
+                        </a:spcAft>
+                        <a:buClrTx/>
+                        <a:buSzTx/>
+                        <a:buFontTx/>
+                        <a:buNone/>
+                        <a:tabLst/>
+                        <a:defRPr/>
+                      </a:pPr>
+                      <a:r>
+                        <a:rPr lang="en-US" sz="800" b="1" dirty="0">
+                          <a:latin typeface="Amazon Ember" panose="020B0603020204020204" pitchFamily="34" charset="0"/>
+                          <a:ea typeface="Amazon Ember" panose="020B0603020204020204" pitchFamily="34" charset="0"/>
+                          <a:cs typeface="Amazon Ember" panose="020B0603020204020204" pitchFamily="34" charset="0"/>
+                        </a:rPr>
+                        <a:t>::/0</a:t>
+                      </a:r>
+                    </a:p>
+                  </a:txBody>
+                  <a:tcPr marL="18000" marR="18000" marT="18000" marB="18000" anchor="ctr"/>
+                </a:tc>
+                <a:tc>
+                  <a:txBody>
+                    <a:bodyPr/>
+                    <a:lstStyle/>
+                    <a:p>
+                      <a:pPr marL="0" marR="0" lvl="0" indent="0" algn="l" defTabSz="914400" rtl="0" eaLnBrk="1" fontAlgn="auto" latinLnBrk="0" hangingPunct="1">
+                        <a:lnSpc>
+                          <a:spcPct val="100000"/>
+                        </a:lnSpc>
+                        <a:spcBef>
+                          <a:spcPts val="0"/>
+                        </a:spcBef>
+                        <a:spcAft>
+                          <a:spcPts val="0"/>
+                        </a:spcAft>
+                        <a:buClrTx/>
+                        <a:buSzTx/>
+                        <a:buFontTx/>
+                        <a:buNone/>
+                        <a:tabLst/>
+                        <a:defRPr/>
+                      </a:pPr>
+                      <a:r>
+                        <a:rPr lang="en-US" sz="800" b="1" dirty="0"/>
+                        <a:t>Outbound</a:t>
+                      </a:r>
+                      <a:r>
+                        <a:rPr lang="en-US" sz="800" dirty="0"/>
+                        <a:t> </a:t>
+                      </a:r>
+                      <a:r>
+                        <a:rPr lang="en-US" sz="800" b="1" dirty="0"/>
+                        <a:t>Inspection VPC Region 1 attachment</a:t>
+                      </a:r>
+                      <a:endParaRPr lang="en-US" sz="800" b="1" dirty="0">
+                        <a:latin typeface="Amazon Ember" panose="020B0603020204020204" pitchFamily="34" charset="0"/>
+                        <a:ea typeface="Amazon Ember" panose="020B0603020204020204" pitchFamily="34" charset="0"/>
+                        <a:cs typeface="Amazon Ember" panose="020B0603020204020204" pitchFamily="34" charset="0"/>
+                      </a:endParaRPr>
+                    </a:p>
+                    <a:p>
+                      <a:pPr marL="0" marR="0" lvl="0" indent="0" algn="l" defTabSz="914400" rtl="0" eaLnBrk="1" fontAlgn="auto" latinLnBrk="0" hangingPunct="1">
+                        <a:lnSpc>
+                          <a:spcPct val="100000"/>
+                        </a:lnSpc>
+                        <a:spcBef>
+                          <a:spcPts val="0"/>
+                        </a:spcBef>
+                        <a:spcAft>
+                          <a:spcPts val="0"/>
+                        </a:spcAft>
+                        <a:buClrTx/>
+                        <a:buSzTx/>
+                        <a:buFontTx/>
+                        <a:buNone/>
+                        <a:tabLst/>
+                        <a:defRPr/>
+                      </a:pPr>
+                      <a:r>
+                        <a:rPr lang="en-US" sz="800" b="1" dirty="0"/>
+                        <a:t>Outbound Inspection VPC Region 2 attachment</a:t>
+                      </a:r>
+                      <a:endParaRPr lang="en-US" sz="800" b="1" dirty="0">
+                        <a:latin typeface="Amazon Ember" panose="020B0603020204020204" pitchFamily="34" charset="0"/>
+                        <a:ea typeface="Amazon Ember" panose="020B0603020204020204" pitchFamily="34" charset="0"/>
+                        <a:cs typeface="Amazon Ember" panose="020B0603020204020204" pitchFamily="34" charset="0"/>
+                      </a:endParaRPr>
+                    </a:p>
+                    <a:p>
+                      <a:pPr marL="0" marR="0" lvl="0" indent="0" algn="l" defTabSz="914400" rtl="0" eaLnBrk="1" fontAlgn="auto" latinLnBrk="0" hangingPunct="1">
+                        <a:lnSpc>
+                          <a:spcPct val="100000"/>
+                        </a:lnSpc>
+                        <a:spcBef>
+                          <a:spcPts val="0"/>
+                        </a:spcBef>
+                        <a:spcAft>
+                          <a:spcPts val="0"/>
+                        </a:spcAft>
+                        <a:buClrTx/>
+                        <a:buSzTx/>
+                        <a:buFontTx/>
+                        <a:buNone/>
+                        <a:tabLst/>
+                        <a:defRPr/>
+                      </a:pPr>
+                      <a:r>
+                        <a:rPr lang="en-US" sz="800" b="1" dirty="0"/>
+                        <a:t>Outbound Inspection VPC Region 3 attachment</a:t>
+                      </a:r>
+                      <a:endParaRPr lang="en-US" sz="800" b="1" dirty="0">
+                        <a:latin typeface="Amazon Ember" panose="020B0603020204020204" pitchFamily="34" charset="0"/>
+                        <a:ea typeface="Amazon Ember" panose="020B0603020204020204" pitchFamily="34" charset="0"/>
+                        <a:cs typeface="Amazon Ember" panose="020B0603020204020204" pitchFamily="34" charset="0"/>
+                      </a:endParaRPr>
+                    </a:p>
+                  </a:txBody>
+                  <a:tcPr marL="18000" marR="18000" marT="18000" marB="18000" anchor="ctr"/>
+                </a:tc>
+                <a:tc>
+                  <a:txBody>
+                    <a:bodyPr/>
+                    <a:lstStyle/>
+                    <a:p>
+                      <a:r>
+                        <a:rPr lang="en-US" sz="800" b="1" dirty="0"/>
+                        <a:t>Static (send-to)</a:t>
+                      </a:r>
+                    </a:p>
+                  </a:txBody>
+                  <a:tcPr marL="18000" marR="18000" marT="18000" marB="18000" anchor="ctr"/>
+                </a:tc>
+                <a:extLst>
+                  <a:ext uri="{0D108BD9-81ED-4DB2-BD59-A6C34878D82A}">
+                    <a16:rowId xmlns:a16="http://schemas.microsoft.com/office/drawing/2014/main" val="3156267661"/>
+                  </a:ext>
+                </a:extLst>
+              </a:tr>
+            </a:tbl>
+          </a:graphicData>
+        </a:graphic>
+      </p:graphicFrame>
+      <p:cxnSp>
+        <p:nvCxnSpPr>
+          <p:cNvPr id="25" name="Straight Connector 24">
+            <a:extLst>
+              <a:ext uri="{FF2B5EF4-FFF2-40B4-BE49-F238E27FC236}">
+                <a16:creationId xmlns:a16="http://schemas.microsoft.com/office/drawing/2014/main" id="{F6EF29E6-133D-E263-1361-43047392F978}"/>
+              </a:ext>
+            </a:extLst>
+          </p:cNvPr>
+          <p:cNvCxnSpPr>
+            <a:cxnSpLocks/>
+            <a:stCxn id="15" idx="2"/>
+          </p:cNvCxnSpPr>
+          <p:nvPr/>
+        </p:nvCxnSpPr>
+        <p:spPr>
+          <a:xfrm>
+            <a:off x="3360526" y="1987404"/>
+            <a:ext cx="0" cy="1365396"/>
+          </a:xfrm>
+          <a:prstGeom prst="line">
+            <a:avLst/>
+          </a:prstGeom>
+          <a:ln w="12700">
+            <a:solidFill>
+              <a:schemeClr val="accent3"/>
+            </a:solidFill>
+            <a:headEnd type="oval" w="med" len="med"/>
+            <a:tailEnd type="oval" w="med" len="med"/>
+          </a:ln>
+        </p:spPr>
+        <p:style>
+          <a:lnRef idx="1">
+            <a:schemeClr val="accent1"/>
+          </a:lnRef>
+          <a:fillRef idx="0">
+            <a:schemeClr val="accent1"/>
+          </a:fillRef>
+          <a:effectRef idx="0">
+            <a:schemeClr val="accent1"/>
+          </a:effectRef>
+          <a:fontRef idx="minor">
+            <a:schemeClr val="tx1"/>
+          </a:fontRef>
+        </p:style>
+      </p:cxnSp>
+      <p:cxnSp>
+        <p:nvCxnSpPr>
+          <p:cNvPr id="255" name="Straight Connector 254">
+            <a:extLst>
+              <a:ext uri="{FF2B5EF4-FFF2-40B4-BE49-F238E27FC236}">
+                <a16:creationId xmlns:a16="http://schemas.microsoft.com/office/drawing/2014/main" id="{EE79C579-E8C3-BC9D-1241-AF79BC16ABEC}"/>
+              </a:ext>
+            </a:extLst>
+          </p:cNvPr>
+          <p:cNvCxnSpPr>
+            <a:cxnSpLocks/>
+            <a:stCxn id="42" idx="2"/>
+          </p:cNvCxnSpPr>
+          <p:nvPr/>
+        </p:nvCxnSpPr>
+        <p:spPr>
+          <a:xfrm>
+            <a:off x="8282013" y="1978273"/>
+            <a:ext cx="0" cy="1374527"/>
+          </a:xfrm>
+          <a:prstGeom prst="line">
+            <a:avLst/>
+          </a:prstGeom>
+          <a:ln w="12700">
+            <a:solidFill>
+              <a:schemeClr val="accent3"/>
+            </a:solidFill>
+            <a:headEnd type="oval" w="med" len="med"/>
+            <a:tailEnd type="oval" w="med" len="med"/>
+          </a:ln>
+        </p:spPr>
+        <p:style>
+          <a:lnRef idx="1">
+            <a:schemeClr val="accent1"/>
+          </a:lnRef>
+          <a:fillRef idx="0">
+            <a:schemeClr val="accent1"/>
+          </a:fillRef>
+          <a:effectRef idx="0">
+            <a:schemeClr val="accent1"/>
+          </a:effectRef>
+          <a:fontRef idx="minor">
+            <a:schemeClr val="tx1"/>
+          </a:fontRef>
+        </p:style>
+      </p:cxnSp>
+      <p:sp>
+        <p:nvSpPr>
+          <p:cNvPr id="130" name="TextBox 12">
+            <a:extLst>
+              <a:ext uri="{FF2B5EF4-FFF2-40B4-BE49-F238E27FC236}">
+                <a16:creationId xmlns:a16="http://schemas.microsoft.com/office/drawing/2014/main" id="{72A9BF4A-6BFE-BB2F-3192-8D5EE92B8884}"/>
+              </a:ext>
+            </a:extLst>
+          </p:cNvPr>
+          <p:cNvSpPr txBox="1">
+            <a:spLocks noChangeArrowheads="1"/>
+          </p:cNvSpPr>
+          <p:nvPr/>
+        </p:nvSpPr>
+        <p:spPr bwMode="auto">
+          <a:xfrm>
+            <a:off x="4253321" y="1565473"/>
+            <a:ext cx="643441" cy="169277"/>
+          </a:xfrm>
+          <a:prstGeom prst="rect">
+            <a:avLst/>
+          </a:prstGeom>
+          <a:noFill/>
+          <a:ln>
+            <a:noFill/>
+          </a:ln>
+          <a:extLst>
+            <a:ext uri="{909E8E84-426E-40DD-AFC4-6F175D3DCCD1}">
+              <a14:hiddenFill xmlns:a14="http://schemas.microsoft.com/office/drawing/2010/main">
+                <a:solidFill>
+                  <a:srgbClr val="FFFFFF"/>
+                </a:solidFill>
+              </a14:hiddenFill>
+            </a:ext>
+            <a:ext uri="{91240B29-F687-4F45-9708-019B960494DF}">
+              <a14:hiddenLine xmlns:a14="http://schemas.microsoft.com/office/drawing/2010/main" w="9525">
+                <a:solidFill>
+                  <a:srgbClr val="000000"/>
+                </a:solidFill>
+                <a:miter lim="800000"/>
+                <a:headEnd/>
+                <a:tailEnd/>
+              </a14:hiddenLine>
+            </a:ext>
+          </a:extLst>
+        </p:spPr>
+        <p:txBody>
+          <a:bodyPr wrap="square">
+            <a:spAutoFit/>
+          </a:bodyPr>
+          <a:lstStyle>
+            <a:lvl1pPr>
+              <a:defRPr>
+                <a:solidFill>
+                  <a:schemeClr val="tx1"/>
+                </a:solidFill>
+                <a:latin typeface="Calibri" panose="020F0502020204030204" pitchFamily="34" charset="0"/>
+              </a:defRPr>
+            </a:lvl1pPr>
+            <a:lvl2pPr marL="742950" indent="-285750">
+              <a:defRPr>
+                <a:solidFill>
+                  <a:schemeClr val="tx1"/>
+                </a:solidFill>
+                <a:latin typeface="Calibri" panose="020F0502020204030204" pitchFamily="34" charset="0"/>
+              </a:defRPr>
+            </a:lvl2pPr>
+            <a:lvl3pPr marL="1143000" indent="-228600">
+              <a:defRPr>
+                <a:solidFill>
+                  <a:schemeClr val="tx1"/>
+                </a:solidFill>
+                <a:latin typeface="Calibri" panose="020F0502020204030204" pitchFamily="34" charset="0"/>
+              </a:defRPr>
+            </a:lvl3pPr>
+            <a:lvl4pPr marL="1600200" indent="-228600">
+              <a:defRPr>
+                <a:solidFill>
+                  <a:schemeClr val="tx1"/>
+                </a:solidFill>
+                <a:latin typeface="Calibri" panose="020F0502020204030204" pitchFamily="34" charset="0"/>
+              </a:defRPr>
+            </a:lvl4pPr>
+            <a:lvl5pPr marL="2057400" indent="-228600">
+              <a:defRPr>
+                <a:solidFill>
+                  <a:schemeClr val="tx1"/>
+                </a:solidFill>
+                <a:latin typeface="Calibri" panose="020F0502020204030204" pitchFamily="34" charset="0"/>
+              </a:defRPr>
+            </a:lvl5pPr>
+            <a:lvl6pPr marL="2514600" indent="-228600" eaLnBrk="0" fontAlgn="base" hangingPunct="0">
+              <a:spcBef>
+                <a:spcPct val="0"/>
+              </a:spcBef>
+              <a:spcAft>
+                <a:spcPct val="0"/>
+              </a:spcAft>
+              <a:defRPr>
+                <a:solidFill>
+                  <a:schemeClr val="tx1"/>
+                </a:solidFill>
+                <a:latin typeface="Calibri" panose="020F0502020204030204" pitchFamily="34" charset="0"/>
+              </a:defRPr>
+            </a:lvl6pPr>
+            <a:lvl7pPr marL="2971800" indent="-228600" eaLnBrk="0" fontAlgn="base" hangingPunct="0">
+              <a:spcBef>
+                <a:spcPct val="0"/>
+              </a:spcBef>
+              <a:spcAft>
+                <a:spcPct val="0"/>
+              </a:spcAft>
+              <a:defRPr>
+                <a:solidFill>
+                  <a:schemeClr val="tx1"/>
+                </a:solidFill>
+                <a:latin typeface="Calibri" panose="020F0502020204030204" pitchFamily="34" charset="0"/>
+              </a:defRPr>
+            </a:lvl7pPr>
+            <a:lvl8pPr marL="3429000" indent="-228600" eaLnBrk="0" fontAlgn="base" hangingPunct="0">
+              <a:spcBef>
+                <a:spcPct val="0"/>
+              </a:spcBef>
+              <a:spcAft>
+                <a:spcPct val="0"/>
+              </a:spcAft>
+              <a:defRPr>
+                <a:solidFill>
+                  <a:schemeClr val="tx1"/>
+                </a:solidFill>
+                <a:latin typeface="Calibri" panose="020F0502020204030204" pitchFamily="34" charset="0"/>
+              </a:defRPr>
+            </a:lvl8pPr>
+            <a:lvl9pPr marL="3886200" indent="-228600" eaLnBrk="0" fontAlgn="base" hangingPunct="0">
+              <a:spcBef>
+                <a:spcPct val="0"/>
+              </a:spcBef>
+              <a:spcAft>
+                <a:spcPct val="0"/>
+              </a:spcAft>
+              <a:defRPr>
+                <a:solidFill>
+                  <a:schemeClr val="tx1"/>
+                </a:solidFill>
+                <a:latin typeface="Calibri" panose="020F0502020204030204" pitchFamily="34" charset="0"/>
+              </a:defRPr>
+            </a:lvl9pPr>
+          </a:lstStyle>
+          <a:p>
+            <a:pPr algn="ctr" eaLnBrk="1" hangingPunct="1"/>
+            <a:r>
+              <a:rPr lang="en-US" altLang="en-US" sz="500" dirty="0">
+                <a:latin typeface="+mn-lt"/>
+                <a:ea typeface="Amazon Ember" panose="020B0603020204020204" pitchFamily="34" charset="0"/>
+                <a:cs typeface="Arial" panose="020B0604020202020204" pitchFamily="34" charset="0"/>
+              </a:rPr>
+              <a:t>IGW</a:t>
+            </a:r>
+          </a:p>
+        </p:txBody>
+      </p:sp>
+      <p:pic>
+        <p:nvPicPr>
+          <p:cNvPr id="131" name="Graphic 10">
+            <a:extLst>
+              <a:ext uri="{FF2B5EF4-FFF2-40B4-BE49-F238E27FC236}">
+                <a16:creationId xmlns:a16="http://schemas.microsoft.com/office/drawing/2014/main" id="{C035924F-4A94-632E-97BA-D18501A2B8E9}"/>
+              </a:ext>
+            </a:extLst>
+          </p:cNvPr>
+          <p:cNvPicPr>
+            <a:picLocks noChangeAspect="1" noChangeArrowheads="1"/>
+          </p:cNvPicPr>
+          <p:nvPr/>
+        </p:nvPicPr>
+        <p:blipFill>
+          <a:blip r:embed="rId10">
+            <a:extLst>
+              <a:ext uri="{28A0092B-C50C-407E-A947-70E740481C1C}">
+                <a14:useLocalDpi xmlns:a14="http://schemas.microsoft.com/office/drawing/2010/main" val="0"/>
+              </a:ext>
+            </a:extLst>
+          </a:blip>
+          <a:srcRect/>
+          <a:stretch>
+            <a:fillRect/>
+          </a:stretch>
+        </p:blipFill>
+        <p:spPr bwMode="auto">
+          <a:xfrm>
+            <a:off x="4476791" y="1419564"/>
+            <a:ext cx="196501" cy="196501"/>
+          </a:xfrm>
+          <a:prstGeom prst="rect">
+            <a:avLst/>
+          </a:prstGeom>
+          <a:solidFill>
+            <a:schemeClr val="bg1"/>
+          </a:solidFill>
+          <a:ln>
+            <a:noFill/>
+          </a:ln>
+        </p:spPr>
+      </p:pic>
+      <p:graphicFrame>
+        <p:nvGraphicFramePr>
+          <p:cNvPr id="47" name="Table 47">
+            <a:extLst>
+              <a:ext uri="{FF2B5EF4-FFF2-40B4-BE49-F238E27FC236}">
+                <a16:creationId xmlns:a16="http://schemas.microsoft.com/office/drawing/2014/main" id="{ABD08769-152B-406E-2E22-0C8CF6586C47}"/>
+              </a:ext>
+            </a:extLst>
+          </p:cNvPr>
+          <p:cNvGraphicFramePr>
+            <a:graphicFrameLocks noGrp="1"/>
+          </p:cNvGraphicFramePr>
+          <p:nvPr>
+            <p:extLst>
+              <p:ext uri="{D42A27DB-BD31-4B8C-83A1-F6EECF244321}">
+                <p14:modId xmlns:p14="http://schemas.microsoft.com/office/powerpoint/2010/main" val="800825625"/>
+              </p:ext>
+            </p:extLst>
+          </p:nvPr>
+        </p:nvGraphicFramePr>
+        <p:xfrm>
+          <a:off x="3519578" y="2488700"/>
+          <a:ext cx="4688052" cy="559680"/>
+        </p:xfrm>
+        <a:graphic>
+          <a:graphicData uri="http://schemas.openxmlformats.org/drawingml/2006/table">
+            <a:tbl>
+              <a:tblPr firstRow="1" bandRow="1">
+                <a:tableStyleId>{7DF18680-E054-41AD-8BC1-D1AEF772440D}</a:tableStyleId>
+              </a:tblPr>
+              <a:tblGrid>
+                <a:gridCol w="1591996">
+                  <a:extLst>
+                    <a:ext uri="{9D8B030D-6E8A-4147-A177-3AD203B41FA5}">
+                      <a16:colId xmlns:a16="http://schemas.microsoft.com/office/drawing/2014/main" val="1534408069"/>
+                    </a:ext>
+                  </a:extLst>
+                </a:gridCol>
+                <a:gridCol w="2362200">
+                  <a:extLst>
+                    <a:ext uri="{9D8B030D-6E8A-4147-A177-3AD203B41FA5}">
+                      <a16:colId xmlns:a16="http://schemas.microsoft.com/office/drawing/2014/main" val="200611525"/>
+                    </a:ext>
+                  </a:extLst>
+                </a:gridCol>
+                <a:gridCol w="733856">
+                  <a:extLst>
+                    <a:ext uri="{9D8B030D-6E8A-4147-A177-3AD203B41FA5}">
+                      <a16:colId xmlns:a16="http://schemas.microsoft.com/office/drawing/2014/main" val="4186196694"/>
+                    </a:ext>
+                  </a:extLst>
+                </a:gridCol>
+              </a:tblGrid>
+              <a:tr h="0">
+                <a:tc>
+                  <a:txBody>
+                    <a:bodyPr/>
+                    <a:lstStyle/>
+                    <a:p>
+                      <a:r>
+                        <a:rPr lang="en-US" sz="800" dirty="0"/>
+                        <a:t>CIDR</a:t>
+                      </a:r>
+                    </a:p>
+                  </a:txBody>
+                  <a:tcPr marL="18000" marR="18000" marT="18000" marB="18000" anchor="ctr"/>
+                </a:tc>
+                <a:tc>
+                  <a:txBody>
+                    <a:bodyPr/>
+                    <a:lstStyle/>
+                    <a:p>
+                      <a:r>
+                        <a:rPr lang="en-US" sz="800" dirty="0"/>
+                        <a:t>Destination</a:t>
+                      </a:r>
+                    </a:p>
+                  </a:txBody>
+                  <a:tcPr marL="18000" marR="18000" marT="18000" marB="18000" anchor="ctr"/>
+                </a:tc>
+                <a:tc>
+                  <a:txBody>
+                    <a:bodyPr/>
+                    <a:lstStyle/>
+                    <a:p>
+                      <a:r>
+                        <a:rPr lang="en-US" sz="800" dirty="0"/>
+                        <a:t>Route type</a:t>
+                      </a:r>
+                    </a:p>
+                  </a:txBody>
+                  <a:tcPr marL="18000" marR="18000" marT="18000" marB="18000" anchor="ctr"/>
+                </a:tc>
+                <a:extLst>
+                  <a:ext uri="{0D108BD9-81ED-4DB2-BD59-A6C34878D82A}">
+                    <a16:rowId xmlns:a16="http://schemas.microsoft.com/office/drawing/2014/main" val="4239006478"/>
+                  </a:ext>
+                </a:extLst>
+              </a:tr>
+              <a:tr h="0">
+                <a:tc>
+                  <a:txBody>
+                    <a:bodyPr/>
+                    <a:lstStyle/>
+                    <a:p>
+                      <a:pPr marL="0" marR="0" lvl="0" indent="0" algn="l" defTabSz="914400" rtl="0" eaLnBrk="1" fontAlgn="auto" latinLnBrk="0" hangingPunct="1">
+                        <a:lnSpc>
+                          <a:spcPct val="100000"/>
+                        </a:lnSpc>
+                        <a:spcBef>
+                          <a:spcPts val="0"/>
+                        </a:spcBef>
+                        <a:spcAft>
+                          <a:spcPts val="0"/>
+                        </a:spcAft>
+                        <a:buClrTx/>
+                        <a:buSzTx/>
+                        <a:buFontTx/>
+                        <a:buNone/>
+                        <a:tabLst/>
+                        <a:defRPr/>
+                      </a:pPr>
+                      <a:r>
+                        <a:rPr lang="en-US" sz="800" b="1" dirty="0">
+                          <a:latin typeface="Amazon Ember" panose="020B0603020204020204" pitchFamily="34" charset="0"/>
+                          <a:ea typeface="Amazon Ember" panose="020B0603020204020204" pitchFamily="34" charset="0"/>
+                          <a:cs typeface="Amazon Ember" panose="020B0603020204020204" pitchFamily="34" charset="0"/>
+                        </a:rPr>
+                        <a:t>0.0.0.0/0</a:t>
+                      </a:r>
+                    </a:p>
+                    <a:p>
+                      <a:pPr marL="0" marR="0" lvl="0" indent="0" algn="l" defTabSz="914400" rtl="0" eaLnBrk="1" fontAlgn="auto" latinLnBrk="0" hangingPunct="1">
+                        <a:lnSpc>
+                          <a:spcPct val="100000"/>
+                        </a:lnSpc>
+                        <a:spcBef>
+                          <a:spcPts val="0"/>
+                        </a:spcBef>
+                        <a:spcAft>
+                          <a:spcPts val="0"/>
+                        </a:spcAft>
+                        <a:buClrTx/>
+                        <a:buSzTx/>
+                        <a:buFontTx/>
+                        <a:buNone/>
+                        <a:tabLst/>
+                        <a:defRPr/>
+                      </a:pPr>
+                      <a:r>
+                        <a:rPr lang="en-US" sz="800" b="1" dirty="0">
+                          <a:latin typeface="Amazon Ember" panose="020B0603020204020204" pitchFamily="34" charset="0"/>
+                          <a:ea typeface="Amazon Ember" panose="020B0603020204020204" pitchFamily="34" charset="0"/>
+                          <a:cs typeface="Amazon Ember" panose="020B0603020204020204" pitchFamily="34" charset="0"/>
+                        </a:rPr>
+                        <a:t>::/0</a:t>
+                      </a:r>
+                    </a:p>
+                  </a:txBody>
+                  <a:tcPr marL="18000" marR="18000" marT="18000" marB="18000" anchor="ctr"/>
+                </a:tc>
+                <a:tc>
+                  <a:txBody>
+                    <a:bodyPr/>
+                    <a:lstStyle/>
+                    <a:p>
+                      <a:pPr marL="0" marR="0" lvl="0" indent="0" algn="l" defTabSz="914400" rtl="0" eaLnBrk="1" fontAlgn="auto" latinLnBrk="0" hangingPunct="1">
+                        <a:lnSpc>
+                          <a:spcPct val="100000"/>
+                        </a:lnSpc>
+                        <a:spcBef>
+                          <a:spcPts val="0"/>
+                        </a:spcBef>
+                        <a:spcAft>
+                          <a:spcPts val="0"/>
+                        </a:spcAft>
+                        <a:buClrTx/>
+                        <a:buSzTx/>
+                        <a:buFontTx/>
+                        <a:buNone/>
+                        <a:tabLst/>
+                        <a:defRPr/>
+                      </a:pPr>
+                      <a:r>
+                        <a:rPr lang="en-US" sz="800" b="1" dirty="0"/>
+                        <a:t>Outbound</a:t>
+                      </a:r>
+                      <a:r>
+                        <a:rPr lang="en-US" sz="800" dirty="0"/>
+                        <a:t> </a:t>
+                      </a:r>
+                      <a:r>
+                        <a:rPr lang="en-US" sz="800" b="1" dirty="0"/>
+                        <a:t>Inspection VPC Region 1 attachment</a:t>
+                      </a:r>
+                      <a:endParaRPr lang="en-US" sz="800" b="1" dirty="0">
+                        <a:latin typeface="Amazon Ember" panose="020B0603020204020204" pitchFamily="34" charset="0"/>
+                        <a:ea typeface="Amazon Ember" panose="020B0603020204020204" pitchFamily="34" charset="0"/>
+                        <a:cs typeface="Amazon Ember" panose="020B0603020204020204" pitchFamily="34" charset="0"/>
+                      </a:endParaRPr>
+                    </a:p>
+                    <a:p>
+                      <a:pPr marL="0" marR="0" lvl="0" indent="0" algn="l" defTabSz="914400" rtl="0" eaLnBrk="1" fontAlgn="auto" latinLnBrk="0" hangingPunct="1">
+                        <a:lnSpc>
+                          <a:spcPct val="100000"/>
+                        </a:lnSpc>
+                        <a:spcBef>
+                          <a:spcPts val="0"/>
+                        </a:spcBef>
+                        <a:spcAft>
+                          <a:spcPts val="0"/>
+                        </a:spcAft>
+                        <a:buClrTx/>
+                        <a:buSzTx/>
+                        <a:buFontTx/>
+                        <a:buNone/>
+                        <a:tabLst/>
+                        <a:defRPr/>
+                      </a:pPr>
+                      <a:r>
+                        <a:rPr lang="en-US" sz="800" b="1" dirty="0"/>
+                        <a:t>Outbound Inspection VPC Region 2 attachment</a:t>
+                      </a:r>
+                      <a:endParaRPr lang="en-US" sz="800" b="1" dirty="0">
+                        <a:latin typeface="Amazon Ember" panose="020B0603020204020204" pitchFamily="34" charset="0"/>
+                        <a:ea typeface="Amazon Ember" panose="020B0603020204020204" pitchFamily="34" charset="0"/>
+                        <a:cs typeface="Amazon Ember" panose="020B0603020204020204" pitchFamily="34" charset="0"/>
+                      </a:endParaRPr>
+                    </a:p>
+                    <a:p>
+                      <a:pPr marL="0" marR="0" lvl="0" indent="0" algn="l" defTabSz="914400" rtl="0" eaLnBrk="1" fontAlgn="auto" latinLnBrk="0" hangingPunct="1">
+                        <a:lnSpc>
+                          <a:spcPct val="100000"/>
+                        </a:lnSpc>
+                        <a:spcBef>
+                          <a:spcPts val="0"/>
+                        </a:spcBef>
+                        <a:spcAft>
+                          <a:spcPts val="0"/>
+                        </a:spcAft>
+                        <a:buClrTx/>
+                        <a:buSzTx/>
+                        <a:buFontTx/>
+                        <a:buNone/>
+                        <a:tabLst/>
+                        <a:defRPr/>
+                      </a:pPr>
+                      <a:r>
+                        <a:rPr lang="en-US" sz="800" b="1" dirty="0"/>
+                        <a:t>Outbound Inspection VPC Region 3 attachment</a:t>
+                      </a:r>
+                      <a:endParaRPr lang="en-US" sz="800" b="1" dirty="0">
+                        <a:latin typeface="Amazon Ember" panose="020B0603020204020204" pitchFamily="34" charset="0"/>
+                        <a:ea typeface="Amazon Ember" panose="020B0603020204020204" pitchFamily="34" charset="0"/>
+                        <a:cs typeface="Amazon Ember" panose="020B0603020204020204" pitchFamily="34" charset="0"/>
+                      </a:endParaRPr>
+                    </a:p>
+                  </a:txBody>
+                  <a:tcPr marL="18000" marR="18000" marT="18000" marB="18000" anchor="ctr"/>
+                </a:tc>
+                <a:tc>
+                  <a:txBody>
+                    <a:bodyPr/>
+                    <a:lstStyle/>
+                    <a:p>
+                      <a:r>
+                        <a:rPr lang="en-US" sz="800" b="1" dirty="0"/>
+                        <a:t>Static (send-to)</a:t>
+                      </a:r>
+                    </a:p>
+                  </a:txBody>
+                  <a:tcPr marL="18000" marR="18000" marT="18000" marB="18000" anchor="ctr"/>
+                </a:tc>
+                <a:extLst>
+                  <a:ext uri="{0D108BD9-81ED-4DB2-BD59-A6C34878D82A}">
+                    <a16:rowId xmlns:a16="http://schemas.microsoft.com/office/drawing/2014/main" val="87712603"/>
+                  </a:ext>
+                </a:extLst>
+              </a:tr>
+            </a:tbl>
+          </a:graphicData>
+        </a:graphic>
+      </p:graphicFrame>
+      <p:sp>
+        <p:nvSpPr>
+          <p:cNvPr id="59" name="TextBox 12">
+            <a:extLst>
+              <a:ext uri="{FF2B5EF4-FFF2-40B4-BE49-F238E27FC236}">
+                <a16:creationId xmlns:a16="http://schemas.microsoft.com/office/drawing/2014/main" id="{12229E2A-1CF9-2B43-A22B-2B7DE9C54A37}"/>
+              </a:ext>
+            </a:extLst>
+          </p:cNvPr>
+          <p:cNvSpPr txBox="1">
+            <a:spLocks noChangeArrowheads="1"/>
+          </p:cNvSpPr>
+          <p:nvPr/>
+        </p:nvSpPr>
+        <p:spPr bwMode="auto">
+          <a:xfrm>
+            <a:off x="6839036" y="1567219"/>
+            <a:ext cx="643441" cy="169277"/>
+          </a:xfrm>
+          <a:prstGeom prst="rect">
+            <a:avLst/>
+          </a:prstGeom>
+          <a:noFill/>
+          <a:ln>
+            <a:noFill/>
+          </a:ln>
+          <a:extLst>
+            <a:ext uri="{909E8E84-426E-40DD-AFC4-6F175D3DCCD1}">
+              <a14:hiddenFill xmlns:a14="http://schemas.microsoft.com/office/drawing/2010/main">
+                <a:solidFill>
+                  <a:srgbClr val="FFFFFF"/>
+                </a:solidFill>
+              </a14:hiddenFill>
+            </a:ext>
+            <a:ext uri="{91240B29-F687-4F45-9708-019B960494DF}">
+              <a14:hiddenLine xmlns:a14="http://schemas.microsoft.com/office/drawing/2010/main" w="9525">
+                <a:solidFill>
+                  <a:srgbClr val="000000"/>
+                </a:solidFill>
+                <a:miter lim="800000"/>
+                <a:headEnd/>
+                <a:tailEnd/>
+              </a14:hiddenLine>
+            </a:ext>
+          </a:extLst>
+        </p:spPr>
+        <p:txBody>
+          <a:bodyPr wrap="square">
+            <a:spAutoFit/>
+          </a:bodyPr>
+          <a:lstStyle>
+            <a:lvl1pPr>
+              <a:defRPr>
+                <a:solidFill>
+                  <a:schemeClr val="tx1"/>
+                </a:solidFill>
+                <a:latin typeface="Calibri" panose="020F0502020204030204" pitchFamily="34" charset="0"/>
+              </a:defRPr>
+            </a:lvl1pPr>
+            <a:lvl2pPr marL="742950" indent="-285750">
+              <a:defRPr>
+                <a:solidFill>
+                  <a:schemeClr val="tx1"/>
+                </a:solidFill>
+                <a:latin typeface="Calibri" panose="020F0502020204030204" pitchFamily="34" charset="0"/>
+              </a:defRPr>
+            </a:lvl2pPr>
+            <a:lvl3pPr marL="1143000" indent="-228600">
+              <a:defRPr>
+                <a:solidFill>
+                  <a:schemeClr val="tx1"/>
+                </a:solidFill>
+                <a:latin typeface="Calibri" panose="020F0502020204030204" pitchFamily="34" charset="0"/>
+              </a:defRPr>
+            </a:lvl3pPr>
+            <a:lvl4pPr marL="1600200" indent="-228600">
+              <a:defRPr>
+                <a:solidFill>
+                  <a:schemeClr val="tx1"/>
+                </a:solidFill>
+                <a:latin typeface="Calibri" panose="020F0502020204030204" pitchFamily="34" charset="0"/>
+              </a:defRPr>
+            </a:lvl4pPr>
+            <a:lvl5pPr marL="2057400" indent="-228600">
+              <a:defRPr>
+                <a:solidFill>
+                  <a:schemeClr val="tx1"/>
+                </a:solidFill>
+                <a:latin typeface="Calibri" panose="020F0502020204030204" pitchFamily="34" charset="0"/>
+              </a:defRPr>
+            </a:lvl5pPr>
+            <a:lvl6pPr marL="2514600" indent="-228600" eaLnBrk="0" fontAlgn="base" hangingPunct="0">
+              <a:spcBef>
+                <a:spcPct val="0"/>
+              </a:spcBef>
+              <a:spcAft>
+                <a:spcPct val="0"/>
+              </a:spcAft>
+              <a:defRPr>
+                <a:solidFill>
+                  <a:schemeClr val="tx1"/>
+                </a:solidFill>
+                <a:latin typeface="Calibri" panose="020F0502020204030204" pitchFamily="34" charset="0"/>
+              </a:defRPr>
+            </a:lvl6pPr>
+            <a:lvl7pPr marL="2971800" indent="-228600" eaLnBrk="0" fontAlgn="base" hangingPunct="0">
+              <a:spcBef>
+                <a:spcPct val="0"/>
+              </a:spcBef>
+              <a:spcAft>
+                <a:spcPct val="0"/>
+              </a:spcAft>
+              <a:defRPr>
+                <a:solidFill>
+                  <a:schemeClr val="tx1"/>
+                </a:solidFill>
+                <a:latin typeface="Calibri" panose="020F0502020204030204" pitchFamily="34" charset="0"/>
+              </a:defRPr>
+            </a:lvl7pPr>
+            <a:lvl8pPr marL="3429000" indent="-228600" eaLnBrk="0" fontAlgn="base" hangingPunct="0">
+              <a:spcBef>
+                <a:spcPct val="0"/>
+              </a:spcBef>
+              <a:spcAft>
+                <a:spcPct val="0"/>
+              </a:spcAft>
+              <a:defRPr>
+                <a:solidFill>
+                  <a:schemeClr val="tx1"/>
+                </a:solidFill>
+                <a:latin typeface="Calibri" panose="020F0502020204030204" pitchFamily="34" charset="0"/>
+              </a:defRPr>
+            </a:lvl8pPr>
+            <a:lvl9pPr marL="3886200" indent="-228600" eaLnBrk="0" fontAlgn="base" hangingPunct="0">
+              <a:spcBef>
+                <a:spcPct val="0"/>
+              </a:spcBef>
+              <a:spcAft>
+                <a:spcPct val="0"/>
+              </a:spcAft>
+              <a:defRPr>
+                <a:solidFill>
+                  <a:schemeClr val="tx1"/>
+                </a:solidFill>
+                <a:latin typeface="Calibri" panose="020F0502020204030204" pitchFamily="34" charset="0"/>
+              </a:defRPr>
+            </a:lvl9pPr>
+          </a:lstStyle>
+          <a:p>
+            <a:pPr algn="ctr" eaLnBrk="1" hangingPunct="1"/>
+            <a:r>
+              <a:rPr lang="en-US" altLang="en-US" sz="500" dirty="0">
+                <a:latin typeface="+mn-lt"/>
+                <a:ea typeface="Amazon Ember" panose="020B0603020204020204" pitchFamily="34" charset="0"/>
+                <a:cs typeface="Arial" panose="020B0604020202020204" pitchFamily="34" charset="0"/>
+              </a:rPr>
+              <a:t>IGW</a:t>
+            </a:r>
+          </a:p>
+        </p:txBody>
+      </p:sp>
+      <p:pic>
+        <p:nvPicPr>
+          <p:cNvPr id="60" name="Graphic 10">
+            <a:extLst>
+              <a:ext uri="{FF2B5EF4-FFF2-40B4-BE49-F238E27FC236}">
+                <a16:creationId xmlns:a16="http://schemas.microsoft.com/office/drawing/2014/main" id="{EE95D752-E42D-4B05-527E-0DCF192E4A3D}"/>
+              </a:ext>
+            </a:extLst>
+          </p:cNvPr>
+          <p:cNvPicPr>
+            <a:picLocks noChangeAspect="1" noChangeArrowheads="1"/>
+          </p:cNvPicPr>
+          <p:nvPr/>
+        </p:nvPicPr>
+        <p:blipFill>
+          <a:blip r:embed="rId10">
+            <a:extLst>
+              <a:ext uri="{28A0092B-C50C-407E-A947-70E740481C1C}">
+                <a14:useLocalDpi xmlns:a14="http://schemas.microsoft.com/office/drawing/2010/main" val="0"/>
+              </a:ext>
+            </a:extLst>
+          </a:blip>
+          <a:srcRect/>
+          <a:stretch>
+            <a:fillRect/>
+          </a:stretch>
+        </p:blipFill>
+        <p:spPr bwMode="auto">
+          <a:xfrm>
+            <a:off x="7062506" y="1421310"/>
+            <a:ext cx="196501" cy="196501"/>
+          </a:xfrm>
+          <a:prstGeom prst="rect">
+            <a:avLst/>
+          </a:prstGeom>
+          <a:solidFill>
+            <a:schemeClr val="bg1"/>
+          </a:solidFill>
+          <a:ln>
+            <a:noFill/>
+          </a:ln>
+        </p:spPr>
+      </p:pic>
+      <p:sp>
+        <p:nvSpPr>
+          <p:cNvPr id="62" name="TextBox 12">
+            <a:extLst>
+              <a:ext uri="{FF2B5EF4-FFF2-40B4-BE49-F238E27FC236}">
+                <a16:creationId xmlns:a16="http://schemas.microsoft.com/office/drawing/2014/main" id="{6AAF76D3-72EB-8B38-D179-F2D661529351}"/>
+              </a:ext>
+            </a:extLst>
+          </p:cNvPr>
+          <p:cNvSpPr txBox="1">
+            <a:spLocks noChangeArrowheads="1"/>
+          </p:cNvSpPr>
+          <p:nvPr/>
+        </p:nvSpPr>
+        <p:spPr bwMode="auto">
+          <a:xfrm>
+            <a:off x="9498212" y="1559313"/>
+            <a:ext cx="643441" cy="169277"/>
+          </a:xfrm>
+          <a:prstGeom prst="rect">
+            <a:avLst/>
+          </a:prstGeom>
+          <a:noFill/>
+          <a:ln>
+            <a:noFill/>
+          </a:ln>
+          <a:extLst>
+            <a:ext uri="{909E8E84-426E-40DD-AFC4-6F175D3DCCD1}">
+              <a14:hiddenFill xmlns:a14="http://schemas.microsoft.com/office/drawing/2010/main">
+                <a:solidFill>
+                  <a:srgbClr val="FFFFFF"/>
+                </a:solidFill>
+              </a14:hiddenFill>
+            </a:ext>
+            <a:ext uri="{91240B29-F687-4F45-9708-019B960494DF}">
+              <a14:hiddenLine xmlns:a14="http://schemas.microsoft.com/office/drawing/2010/main" w="9525">
+                <a:solidFill>
+                  <a:srgbClr val="000000"/>
+                </a:solidFill>
+                <a:miter lim="800000"/>
+                <a:headEnd/>
+                <a:tailEnd/>
+              </a14:hiddenLine>
+            </a:ext>
+          </a:extLst>
+        </p:spPr>
+        <p:txBody>
+          <a:bodyPr wrap="square">
+            <a:spAutoFit/>
+          </a:bodyPr>
+          <a:lstStyle>
+            <a:lvl1pPr>
+              <a:defRPr>
+                <a:solidFill>
+                  <a:schemeClr val="tx1"/>
+                </a:solidFill>
+                <a:latin typeface="Calibri" panose="020F0502020204030204" pitchFamily="34" charset="0"/>
+              </a:defRPr>
+            </a:lvl1pPr>
+            <a:lvl2pPr marL="742950" indent="-285750">
+              <a:defRPr>
+                <a:solidFill>
+                  <a:schemeClr val="tx1"/>
+                </a:solidFill>
+                <a:latin typeface="Calibri" panose="020F0502020204030204" pitchFamily="34" charset="0"/>
+              </a:defRPr>
+            </a:lvl2pPr>
+            <a:lvl3pPr marL="1143000" indent="-228600">
+              <a:defRPr>
+                <a:solidFill>
+                  <a:schemeClr val="tx1"/>
+                </a:solidFill>
+                <a:latin typeface="Calibri" panose="020F0502020204030204" pitchFamily="34" charset="0"/>
+              </a:defRPr>
+            </a:lvl3pPr>
+            <a:lvl4pPr marL="1600200" indent="-228600">
+              <a:defRPr>
+                <a:solidFill>
+                  <a:schemeClr val="tx1"/>
+                </a:solidFill>
+                <a:latin typeface="Calibri" panose="020F0502020204030204" pitchFamily="34" charset="0"/>
+              </a:defRPr>
+            </a:lvl4pPr>
+            <a:lvl5pPr marL="2057400" indent="-228600">
+              <a:defRPr>
+                <a:solidFill>
+                  <a:schemeClr val="tx1"/>
+                </a:solidFill>
+                <a:latin typeface="Calibri" panose="020F0502020204030204" pitchFamily="34" charset="0"/>
+              </a:defRPr>
+            </a:lvl5pPr>
+            <a:lvl6pPr marL="2514600" indent="-228600" eaLnBrk="0" fontAlgn="base" hangingPunct="0">
+              <a:spcBef>
+                <a:spcPct val="0"/>
+              </a:spcBef>
+              <a:spcAft>
+                <a:spcPct val="0"/>
+              </a:spcAft>
+              <a:defRPr>
+                <a:solidFill>
+                  <a:schemeClr val="tx1"/>
+                </a:solidFill>
+                <a:latin typeface="Calibri" panose="020F0502020204030204" pitchFamily="34" charset="0"/>
+              </a:defRPr>
+            </a:lvl6pPr>
+            <a:lvl7pPr marL="2971800" indent="-228600" eaLnBrk="0" fontAlgn="base" hangingPunct="0">
+              <a:spcBef>
+                <a:spcPct val="0"/>
+              </a:spcBef>
+              <a:spcAft>
+                <a:spcPct val="0"/>
+              </a:spcAft>
+              <a:defRPr>
+                <a:solidFill>
+                  <a:schemeClr val="tx1"/>
+                </a:solidFill>
+                <a:latin typeface="Calibri" panose="020F0502020204030204" pitchFamily="34" charset="0"/>
+              </a:defRPr>
+            </a:lvl7pPr>
+            <a:lvl8pPr marL="3429000" indent="-228600" eaLnBrk="0" fontAlgn="base" hangingPunct="0">
+              <a:spcBef>
+                <a:spcPct val="0"/>
+              </a:spcBef>
+              <a:spcAft>
+                <a:spcPct val="0"/>
+              </a:spcAft>
+              <a:defRPr>
+                <a:solidFill>
+                  <a:schemeClr val="tx1"/>
+                </a:solidFill>
+                <a:latin typeface="Calibri" panose="020F0502020204030204" pitchFamily="34" charset="0"/>
+              </a:defRPr>
+            </a:lvl8pPr>
+            <a:lvl9pPr marL="3886200" indent="-228600" eaLnBrk="0" fontAlgn="base" hangingPunct="0">
+              <a:spcBef>
+                <a:spcPct val="0"/>
+              </a:spcBef>
+              <a:spcAft>
+                <a:spcPct val="0"/>
+              </a:spcAft>
+              <a:defRPr>
+                <a:solidFill>
+                  <a:schemeClr val="tx1"/>
+                </a:solidFill>
+                <a:latin typeface="Calibri" panose="020F0502020204030204" pitchFamily="34" charset="0"/>
+              </a:defRPr>
+            </a:lvl9pPr>
+          </a:lstStyle>
+          <a:p>
+            <a:pPr algn="ctr" eaLnBrk="1" hangingPunct="1"/>
+            <a:r>
+              <a:rPr lang="en-US" altLang="en-US" sz="500" dirty="0">
+                <a:latin typeface="+mn-lt"/>
+                <a:ea typeface="Amazon Ember" panose="020B0603020204020204" pitchFamily="34" charset="0"/>
+                <a:cs typeface="Arial" panose="020B0604020202020204" pitchFamily="34" charset="0"/>
+              </a:rPr>
+              <a:t>IGW</a:t>
+            </a:r>
+          </a:p>
+        </p:txBody>
+      </p:sp>
+      <p:pic>
+        <p:nvPicPr>
+          <p:cNvPr id="129" name="Graphic 10">
+            <a:extLst>
+              <a:ext uri="{FF2B5EF4-FFF2-40B4-BE49-F238E27FC236}">
+                <a16:creationId xmlns:a16="http://schemas.microsoft.com/office/drawing/2014/main" id="{70A4B7D2-DB36-1917-8D3C-6B21F4640A16}"/>
+              </a:ext>
+            </a:extLst>
+          </p:cNvPr>
+          <p:cNvPicPr>
+            <a:picLocks noChangeAspect="1" noChangeArrowheads="1"/>
+          </p:cNvPicPr>
+          <p:nvPr/>
+        </p:nvPicPr>
+        <p:blipFill>
+          <a:blip r:embed="rId10">
+            <a:extLst>
+              <a:ext uri="{28A0092B-C50C-407E-A947-70E740481C1C}">
+                <a14:useLocalDpi xmlns:a14="http://schemas.microsoft.com/office/drawing/2010/main" val="0"/>
+              </a:ext>
+            </a:extLst>
+          </a:blip>
+          <a:srcRect/>
+          <a:stretch>
+            <a:fillRect/>
+          </a:stretch>
+        </p:blipFill>
+        <p:spPr bwMode="auto">
+          <a:xfrm>
+            <a:off x="9721682" y="1413404"/>
+            <a:ext cx="196501" cy="196501"/>
+          </a:xfrm>
+          <a:prstGeom prst="rect">
+            <a:avLst/>
+          </a:prstGeom>
+          <a:solidFill>
+            <a:schemeClr val="bg1"/>
+          </a:solidFill>
+          <a:ln>
+            <a:noFill/>
+          </a:ln>
+        </p:spPr>
+      </p:pic>
+      <p:sp>
+        <p:nvSpPr>
+          <p:cNvPr id="4" name="Rectangle 3">
+            <a:extLst>
+              <a:ext uri="{FF2B5EF4-FFF2-40B4-BE49-F238E27FC236}">
+                <a16:creationId xmlns:a16="http://schemas.microsoft.com/office/drawing/2014/main" id="{A7CB24E9-8B0A-E2CD-93A4-A0AD86181C77}"/>
+              </a:ext>
+            </a:extLst>
+          </p:cNvPr>
+          <p:cNvSpPr/>
+          <p:nvPr/>
+        </p:nvSpPr>
+        <p:spPr>
+          <a:xfrm>
+            <a:off x="2944806" y="4484917"/>
+            <a:ext cx="6302388" cy="1128404"/>
+          </a:xfrm>
+          <a:prstGeom prst="rect">
+            <a:avLst/>
+          </a:prstGeom>
+          <a:solidFill>
+            <a:schemeClr val="accent1">
+              <a:lumMod val="20000"/>
+              <a:lumOff val="80000"/>
+            </a:schemeClr>
+          </a:solidFill>
+          <a:ln>
+            <a:solidFill>
+              <a:srgbClr val="7030A0"/>
+            </a:solidFill>
+          </a:ln>
+        </p:spPr>
+        <p:style>
+          <a:lnRef idx="2">
+            <a:schemeClr val="accent1">
+              <a:shade val="50000"/>
+            </a:schemeClr>
+          </a:lnRef>
+          <a:fillRef idx="1">
+            <a:schemeClr val="accent1"/>
+          </a:fillRef>
+          <a:effectRef idx="0">
+            <a:schemeClr val="accent1"/>
+          </a:effectRef>
+          <a:fontRef idx="minor">
+            <a:schemeClr val="lt1"/>
+          </a:fontRef>
+        </p:style>
+        <p:txBody>
+          <a:bodyPr vert="vert270" rtlCol="0" anchor="t"/>
+          <a:lstStyle/>
+          <a:p>
+            <a:pPr algn="ctr"/>
+            <a:r>
+              <a:rPr lang="en-US" sz="600" dirty="0">
+                <a:solidFill>
+                  <a:schemeClr val="tx1"/>
+                </a:solidFill>
+                <a:latin typeface="Amazon Ember" panose="020B0603020204020204" pitchFamily="34" charset="0"/>
+                <a:ea typeface="Amazon Ember" panose="020B0603020204020204" pitchFamily="34" charset="0"/>
+                <a:cs typeface="Amazon Ember" panose="020B0603020204020204" pitchFamily="34" charset="0"/>
+              </a:rPr>
+              <a:t>Network Function Group</a:t>
+            </a:r>
+          </a:p>
+          <a:p>
+            <a:pPr algn="ctr"/>
+            <a:r>
+              <a:rPr lang="en-US" sz="600" dirty="0">
+                <a:solidFill>
+                  <a:schemeClr val="tx1"/>
+                </a:solidFill>
+                <a:latin typeface="Amazon Ember" panose="020B0603020204020204" pitchFamily="34" charset="0"/>
+                <a:ea typeface="Amazon Ember" panose="020B0603020204020204" pitchFamily="34" charset="0"/>
+                <a:cs typeface="Amazon Ember" panose="020B0603020204020204" pitchFamily="34" charset="0"/>
+              </a:rPr>
+              <a:t>(i</a:t>
+            </a:r>
+            <a:r>
+              <a:rPr lang="en-US" sz="600" b="1" dirty="0">
+                <a:solidFill>
+                  <a:schemeClr val="tx1"/>
+                </a:solidFill>
+                <a:latin typeface="Amazon Ember" panose="020B0603020204020204" pitchFamily="34" charset="0"/>
+                <a:ea typeface="Amazon Ember" panose="020B0603020204020204" pitchFamily="34" charset="0"/>
+                <a:cs typeface="Amazon Ember" panose="020B0603020204020204" pitchFamily="34" charset="0"/>
+              </a:rPr>
+              <a:t>nspectionVpcs</a:t>
+            </a:r>
+            <a:r>
+              <a:rPr lang="en-US" sz="600" dirty="0">
+                <a:solidFill>
+                  <a:schemeClr val="tx1"/>
+                </a:solidFill>
+                <a:latin typeface="Amazon Ember" panose="020B0603020204020204" pitchFamily="34" charset="0"/>
+                <a:ea typeface="Amazon Ember" panose="020B0603020204020204" pitchFamily="34" charset="0"/>
+                <a:cs typeface="Amazon Ember" panose="020B0603020204020204" pitchFamily="34" charset="0"/>
+              </a:rPr>
+              <a:t>)</a:t>
+            </a:r>
+          </a:p>
+          <a:p>
+            <a:pPr algn="ctr"/>
+            <a:endParaRPr lang="en-ES" sz="600" dirty="0">
+              <a:solidFill>
+                <a:schemeClr val="tx1"/>
+              </a:solidFill>
+              <a:latin typeface="Amazon Ember" panose="020B0603020204020204" pitchFamily="34" charset="0"/>
+              <a:ea typeface="Amazon Ember" panose="020B0603020204020204" pitchFamily="34" charset="0"/>
+              <a:cs typeface="Amazon Ember" panose="020B0603020204020204" pitchFamily="34" charset="0"/>
+            </a:endParaRPr>
+          </a:p>
+        </p:txBody>
+      </p:sp>
+    </p:spTree>
+    <p:extLst>
+      <p:ext uri="{BB962C8B-B14F-4D97-AF65-F5344CB8AC3E}">
+        <p14:creationId xmlns:p14="http://schemas.microsoft.com/office/powerpoint/2010/main" val="511072049"/>
+      </p:ext>
+    </p:extLst>
+  </p:cSld>
+  <p:clrMapOvr>
+    <a:masterClrMapping/>
+  </p:clrMapOvr>
+</p:sld>
+</file>
+
+<file path=ppt/slides/slide3.xml><?xml version="1.0" encoding="utf-8"?>
+<p:sld xmlns:a="http://schemas.openxmlformats.org/drawingml/2006/main" xmlns:r="http://schemas.openxmlformats.org/officeDocument/2006/relationships" xmlns:p="http://schemas.openxmlformats.org/presentationml/2006/main">
+  <p:cSld>
+    <p:spTree>
+      <p:nvGrpSpPr>
+        <p:cNvPr id="1" name=""/>
+        <p:cNvGrpSpPr/>
+        <p:nvPr/>
+      </p:nvGrpSpPr>
+      <p:grpSpPr>
+        <a:xfrm>
+          <a:off x="0" y="0"/>
+          <a:ext cx="0" cy="0"/>
+          <a:chOff x="0" y="0"/>
+          <a:chExt cx="0" cy="0"/>
+        </a:xfrm>
+      </p:grpSpPr>
+      <p:sp>
+        <p:nvSpPr>
+          <p:cNvPr id="13" name="Rectangle 12">
+            <a:extLst>
+              <a:ext uri="{FF2B5EF4-FFF2-40B4-BE49-F238E27FC236}">
+                <a16:creationId xmlns:a16="http://schemas.microsoft.com/office/drawing/2014/main" id="{FC6B48DD-115A-6813-DED7-0B2E6B54CAC4}"/>
+              </a:ext>
+            </a:extLst>
+          </p:cNvPr>
+          <p:cNvSpPr/>
+          <p:nvPr/>
+        </p:nvSpPr>
+        <p:spPr>
+          <a:xfrm>
             <a:off x="1447800" y="909104"/>
             <a:ext cx="8688504" cy="5039791"/>
           </a:xfrm>
@@ -12908,7 +16831,7 @@
 </p:sld>
 </file>
 
-<file path=ppt/slides/slide3.xml><?xml version="1.0" encoding="utf-8"?>
+<file path=ppt/slides/slide4.xml><?xml version="1.0" encoding="utf-8"?>
 <p:sld xmlns:a="http://schemas.openxmlformats.org/drawingml/2006/main" xmlns:r="http://schemas.openxmlformats.org/officeDocument/2006/relationships" xmlns:p="http://schemas.openxmlformats.org/presentationml/2006/main">
   <p:cSld>
     <p:spTree>
@@ -18303,7 +22226,7 @@
 </p:sld>
 </file>
 
-<file path=ppt/slides/slide4.xml><?xml version="1.0" encoding="utf-8"?>
+<file path=ppt/slides/slide5.xml><?xml version="1.0" encoding="utf-8"?>
 <p:sld xmlns:a="http://schemas.openxmlformats.org/drawingml/2006/main" xmlns:r="http://schemas.openxmlformats.org/officeDocument/2006/relationships" xmlns:p="http://schemas.openxmlformats.org/presentationml/2006/main">
   <p:cSld>
     <p:spTree>

</xml_diff>